<commit_message>
prise en compte de la passe de thierry
</commit_message>
<xml_diff>
--- a/w9/w9-s2-av-slide1.pptx
+++ b/w9/w9-s2-av-slide1.pptx
@@ -5,24 +5,25 @@
     <p:sldMasterId id="2147483649" r:id="rId1"/>
   </p:sldMasterIdLst>
   <p:notesMasterIdLst>
-    <p:notesMasterId r:id="rId14"/>
+    <p:notesMasterId r:id="rId15"/>
   </p:notesMasterIdLst>
   <p:handoutMasterIdLst>
-    <p:handoutMasterId r:id="rId15"/>
+    <p:handoutMasterId r:id="rId16"/>
   </p:handoutMasterIdLst>
   <p:sldIdLst>
     <p:sldId id="923" r:id="rId2"/>
     <p:sldId id="904" r:id="rId3"/>
-    <p:sldId id="900" r:id="rId4"/>
-    <p:sldId id="902" r:id="rId5"/>
-    <p:sldId id="922" r:id="rId6"/>
-    <p:sldId id="908" r:id="rId7"/>
-    <p:sldId id="909" r:id="rId8"/>
-    <p:sldId id="912" r:id="rId9"/>
-    <p:sldId id="913" r:id="rId10"/>
-    <p:sldId id="918" r:id="rId11"/>
-    <p:sldId id="921" r:id="rId12"/>
-    <p:sldId id="924" r:id="rId13"/>
+    <p:sldId id="902" r:id="rId4"/>
+    <p:sldId id="900" r:id="rId5"/>
+    <p:sldId id="925" r:id="rId6"/>
+    <p:sldId id="922" r:id="rId7"/>
+    <p:sldId id="908" r:id="rId8"/>
+    <p:sldId id="909" r:id="rId9"/>
+    <p:sldId id="912" r:id="rId10"/>
+    <p:sldId id="913" r:id="rId11"/>
+    <p:sldId id="918" r:id="rId12"/>
+    <p:sldId id="921" r:id="rId13"/>
+    <p:sldId id="924" r:id="rId14"/>
   </p:sldIdLst>
   <p:sldSz cx="12192000" cy="6858000"/>
   <p:notesSz cx="7099300" cy="10234613"/>
@@ -158,8 +159,9 @@
           <p14:sldIdLst>
             <p14:sldId id="923"/>
             <p14:sldId id="904"/>
+            <p14:sldId id="902"/>
             <p14:sldId id="900"/>
-            <p14:sldId id="902"/>
+            <p14:sldId id="925"/>
             <p14:sldId id="922"/>
             <p14:sldId id="908"/>
             <p14:sldId id="909"/>
@@ -1177,27 +1179,11 @@
           <a:p>
             <a:r>
               <a:rPr lang="fr-FR" dirty="0" smtClean="0"/>
-              <a:t>La déclaration</a:t>
+              <a:t>Cette</a:t>
             </a:r>
             <a:r>
               <a:rPr lang="fr-FR" baseline="0" dirty="0" smtClean="0"/>
-              <a:t> </a:t>
-            </a:r>
-            <a:r>
-              <a:rPr lang="fr-FR" baseline="0" dirty="0" err="1" smtClean="0"/>
-              <a:t>classmethod</a:t>
-            </a:r>
-            <a:r>
-              <a:rPr lang="fr-FR" baseline="0" dirty="0" smtClean="0"/>
-              <a:t> ou </a:t>
-            </a:r>
-            <a:r>
-              <a:rPr lang="fr-FR" baseline="0" dirty="0" err="1" smtClean="0"/>
-              <a:t>staticmethod</a:t>
-            </a:r>
-            <a:r>
-              <a:rPr lang="fr-FR" baseline="0" dirty="0" smtClean="0"/>
-              <a:t> peut-être loin de la méthode, ce qui rend la lecture difficile. </a:t>
+              <a:t> syntaxe permet de rendre le type de la méthode explicite, et comme le décorateur doit être juste avant la déclaration de la fonction, ça rend également plus probable que le développeur n’oubliera pas de décorer la fonction.</a:t>
             </a:r>
             <a:endParaRPr lang="fr-FR" dirty="0"/>
           </a:p>
@@ -1235,7 +1221,7 @@
     </p:spTree>
     <p:extLst>
       <p:ext uri="{BB962C8B-B14F-4D97-AF65-F5344CB8AC3E}">
-        <p14:creationId xmlns:p14="http://schemas.microsoft.com/office/powerpoint/2010/main" val="3741400765"/>
+        <p14:creationId xmlns:p14="http://schemas.microsoft.com/office/powerpoint/2010/main" val="117080793"/>
       </p:ext>
     </p:extLst>
   </p:cSld>
@@ -1291,11 +1277,27 @@
           <a:p>
             <a:r>
               <a:rPr lang="fr-FR" dirty="0" smtClean="0"/>
-              <a:t>Cette</a:t>
+              <a:t>La déclaration</a:t>
             </a:r>
             <a:r>
               <a:rPr lang="fr-FR" baseline="0" dirty="0" smtClean="0"/>
-              <a:t> syntaxe permet de rendre le type de la méthode explicite, et comme le décorateur doit être juste avant la déclaration de la fonction, ça rend également plus probable que le développeur n’oubliera pas de décorer la fonction.</a:t>
+              <a:t> </a:t>
+            </a:r>
+            <a:r>
+              <a:rPr lang="fr-FR" baseline="0" dirty="0" err="1" smtClean="0"/>
+              <a:t>classmethod</a:t>
+            </a:r>
+            <a:r>
+              <a:rPr lang="fr-FR" baseline="0" dirty="0" smtClean="0"/>
+              <a:t> ou </a:t>
+            </a:r>
+            <a:r>
+              <a:rPr lang="fr-FR" baseline="0" dirty="0" err="1" smtClean="0"/>
+              <a:t>staticmethod</a:t>
+            </a:r>
+            <a:r>
+              <a:rPr lang="fr-FR" baseline="0" dirty="0" smtClean="0"/>
+              <a:t> peut-être loin de la méthode, ce qui rend la lecture difficile. </a:t>
             </a:r>
             <a:endParaRPr lang="fr-FR" dirty="0"/>
           </a:p>
@@ -1333,7 +1335,7 @@
     </p:spTree>
     <p:extLst>
       <p:ext uri="{BB962C8B-B14F-4D97-AF65-F5344CB8AC3E}">
-        <p14:creationId xmlns:p14="http://schemas.microsoft.com/office/powerpoint/2010/main" val="117080793"/>
+        <p14:creationId xmlns:p14="http://schemas.microsoft.com/office/powerpoint/2010/main" val="3741400765"/>
       </p:ext>
     </p:extLst>
   </p:cSld>
@@ -1387,125 +1389,15 @@
           <a:bodyPr/>
           <a:lstStyle/>
           <a:p>
-            <a:pPr marL="0" marR="0" indent="0" algn="l" defTabSz="914400" rtl="0" eaLnBrk="0" fontAlgn="base" latinLnBrk="0" hangingPunct="0">
-              <a:lnSpc>
-                <a:spcPct val="100000"/>
-              </a:lnSpc>
-              <a:spcBef>
-                <a:spcPct val="30000"/>
-              </a:spcBef>
-              <a:spcAft>
-                <a:spcPct val="0"/>
-              </a:spcAft>
-              <a:buClrTx/>
-              <a:buSzTx/>
-              <a:buFontTx/>
-              <a:buNone/>
-              <a:tabLst/>
-              <a:defRPr/>
-            </a:pPr>
             <a:r>
               <a:rPr lang="fr-FR" dirty="0" smtClean="0"/>
-              <a:t>Voic</a:t>
+              <a:t>Cette</a:t>
             </a:r>
             <a:r>
               <a:rPr lang="fr-FR" baseline="0" dirty="0" smtClean="0"/>
-              <a:t>i la syntaxe générale d’un décorateur. </a:t>
-            </a:r>
-          </a:p>
-          <a:p>
-            <a:pPr marL="0" marR="0" indent="0" algn="l" defTabSz="914400" rtl="0" eaLnBrk="0" fontAlgn="base" latinLnBrk="0" hangingPunct="0">
-              <a:lnSpc>
-                <a:spcPct val="100000"/>
-              </a:lnSpc>
-              <a:spcBef>
-                <a:spcPct val="30000"/>
-              </a:spcBef>
-              <a:spcAft>
-                <a:spcPct val="0"/>
-              </a:spcAft>
-              <a:buClrTx/>
-              <a:buSzTx/>
-              <a:buFontTx/>
-              <a:buNone/>
-              <a:tabLst/>
-              <a:defRPr/>
-            </a:pPr>
-            <a:endParaRPr lang="fr-FR" dirty="0" smtClean="0"/>
-          </a:p>
-          <a:p>
-            <a:pPr marL="0" marR="0" indent="0" algn="l" defTabSz="914400" rtl="0" eaLnBrk="0" fontAlgn="base" latinLnBrk="0" hangingPunct="0">
-              <a:lnSpc>
-                <a:spcPct val="100000"/>
-              </a:lnSpc>
-              <a:spcBef>
-                <a:spcPct val="30000"/>
-              </a:spcBef>
-              <a:spcAft>
-                <a:spcPct val="0"/>
-              </a:spcAft>
-              <a:buClrTx/>
-              <a:buSzTx/>
-              <a:buFontTx/>
-              <a:buNone/>
-              <a:tabLst/>
-              <a:defRPr/>
-            </a:pPr>
-            <a:r>
-              <a:rPr lang="fr-FR" dirty="0" smtClean="0"/>
-              <a:t>Il faut faire la distinction entre la syntaxe</a:t>
-            </a:r>
-            <a:r>
-              <a:rPr lang="fr-FR" baseline="0" dirty="0" smtClean="0"/>
-              <a:t> @</a:t>
-            </a:r>
-            <a:r>
-              <a:rPr lang="fr-FR" baseline="0" dirty="0" err="1" smtClean="0"/>
-              <a:t>decorateur</a:t>
-            </a:r>
-            <a:r>
-              <a:rPr lang="fr-FR" baseline="0" dirty="0" smtClean="0"/>
-              <a:t> qui est juste un raccourci pour écrire f  = </a:t>
-            </a:r>
-            <a:r>
-              <a:rPr lang="fr-FR" baseline="0" dirty="0" err="1" smtClean="0"/>
-              <a:t>decorateur</a:t>
-            </a:r>
-            <a:r>
-              <a:rPr lang="fr-FR" baseline="0" dirty="0" smtClean="0"/>
-              <a:t>(f) et la concept de </a:t>
-            </a:r>
-            <a:r>
-              <a:rPr lang="fr-FR" baseline="0" dirty="0" err="1" smtClean="0"/>
-              <a:t>decoration</a:t>
-            </a:r>
-            <a:r>
-              <a:rPr lang="fr-FR" baseline="0" dirty="0" smtClean="0"/>
-              <a:t>. La syntaxe est juste là pour rendre plus clair qu’une fonction est décorée, il n’y a rien de profond ici. Par contre, </a:t>
-            </a:r>
-          </a:p>
-          <a:p>
-            <a:pPr marL="0" marR="0" indent="0" algn="l" defTabSz="914400" rtl="0" eaLnBrk="0" fontAlgn="base" latinLnBrk="0" hangingPunct="0">
-              <a:lnSpc>
-                <a:spcPct val="100000"/>
-              </a:lnSpc>
-              <a:spcBef>
-                <a:spcPct val="30000"/>
-              </a:spcBef>
-              <a:spcAft>
-                <a:spcPct val="0"/>
-              </a:spcAft>
-              <a:buClrTx/>
-              <a:buSzTx/>
-              <a:buFontTx/>
-              <a:buNone/>
-              <a:tabLst/>
-              <a:defRPr/>
-            </a:pPr>
-            <a:r>
-              <a:rPr lang="fr-FR" baseline="0" dirty="0" smtClean="0"/>
-              <a:t>La concept de décorateur est complexe et très puissant puisque l’on peut implémenter ses propres décorateurs. </a:t>
-            </a:r>
+              <a:t> syntaxe permet de rendre le type de la méthode explicite, et comme le décorateur doit être juste avant la déclaration de la fonction, ça rend également plus probable que le développeur n’oubliera pas de décorer la fonction.</a:t>
+            </a:r>
+            <a:endParaRPr lang="fr-FR" dirty="0"/>
           </a:p>
         </p:txBody>
       </p:sp>
@@ -1541,7 +1433,7 @@
     </p:spTree>
     <p:extLst>
       <p:ext uri="{BB962C8B-B14F-4D97-AF65-F5344CB8AC3E}">
-        <p14:creationId xmlns:p14="http://schemas.microsoft.com/office/powerpoint/2010/main" val="74439262"/>
+        <p14:creationId xmlns:p14="http://schemas.microsoft.com/office/powerpoint/2010/main" val="90657858"/>
       </p:ext>
     </p:extLst>
   </p:cSld>
@@ -1613,10 +1505,12 @@
               <a:defRPr/>
             </a:pPr>
             <a:r>
-              <a:rPr lang="fr-FR" sz="1200" dirty="0" smtClean="0">
-                <a:cs typeface="Courier New" panose="02070309020205020404" pitchFamily="49" charset="0"/>
-              </a:rPr>
-              <a:t>C’est quoi un décorateur</a:t>
+              <a:rPr lang="fr-FR" dirty="0" smtClean="0"/>
+              <a:t>Voic</a:t>
+            </a:r>
+            <a:r>
+              <a:rPr lang="fr-FR" baseline="0" dirty="0" smtClean="0"/>
+              <a:t>i la syntaxe générale d’un décorateur. </a:t>
             </a:r>
           </a:p>
           <a:p>
@@ -1637,36 +1531,7 @@
               <a:tabLst/>
               <a:defRPr/>
             </a:pPr>
-            <a:r>
-              <a:rPr lang="fr-FR" sz="1200" dirty="0" smtClean="0">
-                <a:cs typeface="Courier New" panose="02070309020205020404" pitchFamily="49" charset="0"/>
-              </a:rPr>
-              <a:t>C’est un </a:t>
-            </a:r>
-            <a:r>
-              <a:rPr lang="fr-FR" sz="1200" i="1" dirty="0" err="1" smtClean="0">
-                <a:cs typeface="Courier New" panose="02070309020205020404" pitchFamily="49" charset="0"/>
-              </a:rPr>
-              <a:t>callable</a:t>
-            </a:r>
-            <a:r>
-              <a:rPr lang="fr-FR" sz="1200" dirty="0" smtClean="0">
-                <a:cs typeface="Courier New" panose="02070309020205020404" pitchFamily="49" charset="0"/>
-              </a:rPr>
-              <a:t> qui prend comme argument la fonction décorée et produit un </a:t>
-            </a:r>
-            <a:r>
-              <a:rPr lang="fr-FR" sz="1200" i="1" dirty="0" err="1" smtClean="0">
-                <a:cs typeface="Courier New" panose="02070309020205020404" pitchFamily="49" charset="0"/>
-              </a:rPr>
-              <a:t>callable</a:t>
-            </a:r>
-            <a:r>
-              <a:rPr lang="fr-FR" sz="1200" dirty="0" smtClean="0">
-                <a:cs typeface="Courier New" panose="02070309020205020404" pitchFamily="49" charset="0"/>
-              </a:rPr>
-              <a:t> qui prend le même nombre d’arguments que la fonction décorée !</a:t>
-            </a:r>
+            <a:endParaRPr lang="fr-FR" dirty="0" smtClean="0"/>
           </a:p>
           <a:p>
             <a:pPr marL="0" marR="0" indent="0" algn="l" defTabSz="914400" rtl="0" eaLnBrk="0" fontAlgn="base" latinLnBrk="0" hangingPunct="0">
@@ -1686,7 +1551,38 @@
               <a:tabLst/>
               <a:defRPr/>
             </a:pPr>
-            <a:endParaRPr lang="fr-FR" dirty="0" smtClean="0"/>
+            <a:r>
+              <a:rPr lang="fr-FR" dirty="0" smtClean="0"/>
+              <a:t>Il faut faire la distinction entre la syntaxe</a:t>
+            </a:r>
+            <a:r>
+              <a:rPr lang="fr-FR" baseline="0" dirty="0" smtClean="0"/>
+              <a:t> @</a:t>
+            </a:r>
+            <a:r>
+              <a:rPr lang="fr-FR" baseline="0" dirty="0" err="1" smtClean="0"/>
+              <a:t>decorateur</a:t>
+            </a:r>
+            <a:r>
+              <a:rPr lang="fr-FR" baseline="0" dirty="0" smtClean="0"/>
+              <a:t> qui est juste un raccourci pour écrire f  = </a:t>
+            </a:r>
+            <a:r>
+              <a:rPr lang="fr-FR" baseline="0" dirty="0" err="1" smtClean="0"/>
+              <a:t>decorateur</a:t>
+            </a:r>
+            <a:r>
+              <a:rPr lang="fr-FR" baseline="0" dirty="0" smtClean="0"/>
+              <a:t>(f) et la concept de </a:t>
+            </a:r>
+            <a:r>
+              <a:rPr lang="fr-FR" baseline="0" dirty="0" err="1" smtClean="0"/>
+              <a:t>decoration</a:t>
+            </a:r>
+            <a:r>
+              <a:rPr lang="fr-FR" baseline="0" dirty="0" smtClean="0"/>
+              <a:t>. La syntaxe est juste là pour rendre plus clair qu’une fonction est décorée, il n’y a rien de profond ici. Par contre, </a:t>
+            </a:r>
           </a:p>
           <a:p>
             <a:pPr marL="0" marR="0" indent="0" algn="l" defTabSz="914400" rtl="0" eaLnBrk="0" fontAlgn="base" latinLnBrk="0" hangingPunct="0">
@@ -1707,87 +1603,9 @@
               <a:defRPr/>
             </a:pPr>
             <a:r>
-              <a:rPr lang="fr-FR" dirty="0" smtClean="0"/>
-              <a:t>Un</a:t>
-            </a:r>
-            <a:r>
               <a:rPr lang="fr-FR" baseline="0" dirty="0" smtClean="0"/>
-              <a:t> décorateur peut donc être une fonction ou une classe et retourner une fonction ou une classe. Souvent, le décorateur retourne directement l’objet décoré, mais il peut également retourner n’importe quel objet </a:t>
-            </a:r>
-            <a:r>
-              <a:rPr lang="fr-FR" baseline="0" dirty="0" err="1" smtClean="0"/>
-              <a:t>callable</a:t>
-            </a:r>
-            <a:r>
-              <a:rPr lang="fr-FR" baseline="0" dirty="0" smtClean="0"/>
-              <a:t>. </a:t>
-            </a:r>
-          </a:p>
-          <a:p>
-            <a:pPr marL="0" marR="0" indent="0" algn="l" defTabSz="914400" rtl="0" eaLnBrk="0" fontAlgn="base" latinLnBrk="0" hangingPunct="0">
-              <a:lnSpc>
-                <a:spcPct val="100000"/>
-              </a:lnSpc>
-              <a:spcBef>
-                <a:spcPct val="30000"/>
-              </a:spcBef>
-              <a:spcAft>
-                <a:spcPct val="0"/>
-              </a:spcAft>
-              <a:buClrTx/>
-              <a:buSzTx/>
-              <a:buFontTx/>
-              <a:buNone/>
-              <a:tabLst/>
-              <a:defRPr/>
-            </a:pPr>
-            <a:r>
-              <a:rPr lang="fr-FR" baseline="0" dirty="0" smtClean="0"/>
-              <a:t>f(a, b) </a:t>
-            </a:r>
-            <a:r>
-              <a:rPr lang="fr-FR" baseline="0" dirty="0" smtClean="0">
-                <a:sym typeface="Wingdings" panose="05000000000000000000" pitchFamily="2" charset="2"/>
-              </a:rPr>
-              <a:t> </a:t>
-            </a:r>
-            <a:r>
-              <a:rPr lang="fr-FR" baseline="0" dirty="0" err="1" smtClean="0">
-                <a:sym typeface="Wingdings" panose="05000000000000000000" pitchFamily="2" charset="2"/>
-              </a:rPr>
-              <a:t>decorateur</a:t>
-            </a:r>
-            <a:r>
-              <a:rPr lang="fr-FR" baseline="0" dirty="0" smtClean="0">
-                <a:sym typeface="Wingdings" panose="05000000000000000000" pitchFamily="2" charset="2"/>
-              </a:rPr>
-              <a:t>(f)(</a:t>
-            </a:r>
-            <a:r>
-              <a:rPr lang="fr-FR" baseline="0" dirty="0" err="1" smtClean="0">
-                <a:sym typeface="Wingdings" panose="05000000000000000000" pitchFamily="2" charset="2"/>
-              </a:rPr>
-              <a:t>a,b</a:t>
-            </a:r>
-            <a:r>
-              <a:rPr lang="fr-FR" baseline="0" dirty="0" smtClean="0">
-                <a:sym typeface="Wingdings" panose="05000000000000000000" pitchFamily="2" charset="2"/>
-              </a:rPr>
-              <a:t>). L’</a:t>
-            </a:r>
-            <a:r>
-              <a:rPr lang="fr-FR" baseline="0" dirty="0" err="1" smtClean="0">
-                <a:sym typeface="Wingdings" panose="05000000000000000000" pitchFamily="2" charset="2"/>
-              </a:rPr>
-              <a:t>équivallence</a:t>
-            </a:r>
-            <a:r>
-              <a:rPr lang="fr-FR" baseline="0" dirty="0" smtClean="0">
-                <a:sym typeface="Wingdings" panose="05000000000000000000" pitchFamily="2" charset="2"/>
-              </a:rPr>
-              <a:t> est lorsque f est décorée par le décorateur</a:t>
-            </a:r>
-            <a:endParaRPr lang="fr-FR" dirty="0"/>
+              <a:t>La concept de décorateur est complexe et très puissant puisque l’on peut implémenter ses propres décorateurs. </a:t>
+            </a:r>
           </a:p>
         </p:txBody>
       </p:sp>
@@ -1823,7 +1641,7 @@
     </p:spTree>
     <p:extLst>
       <p:ext uri="{BB962C8B-B14F-4D97-AF65-F5344CB8AC3E}">
-        <p14:creationId xmlns:p14="http://schemas.microsoft.com/office/powerpoint/2010/main" val="3737740062"/>
+        <p14:creationId xmlns:p14="http://schemas.microsoft.com/office/powerpoint/2010/main" val="74439262"/>
       </p:ext>
     </p:extLst>
   </p:cSld>
@@ -1895,12 +1713,10 @@
               <a:defRPr/>
             </a:pPr>
             <a:r>
-              <a:rPr lang="fr-FR" dirty="0" smtClean="0"/>
-              <a:t>Voic</a:t>
-            </a:r>
-            <a:r>
-              <a:rPr lang="fr-FR" baseline="0" dirty="0" smtClean="0"/>
-              <a:t>i la syntaxe générale d’un décorateur. </a:t>
+              <a:rPr lang="fr-FR" sz="1200" dirty="0" smtClean="0">
+                <a:cs typeface="Courier New" panose="02070309020205020404" pitchFamily="49" charset="0"/>
+              </a:rPr>
+              <a:t>C’est quoi un décorateur</a:t>
             </a:r>
           </a:p>
           <a:p>
@@ -1921,7 +1737,36 @@
               <a:tabLst/>
               <a:defRPr/>
             </a:pPr>
-            <a:endParaRPr lang="fr-FR" dirty="0" smtClean="0"/>
+            <a:r>
+              <a:rPr lang="fr-FR" sz="1200" dirty="0" smtClean="0">
+                <a:cs typeface="Courier New" panose="02070309020205020404" pitchFamily="49" charset="0"/>
+              </a:rPr>
+              <a:t>C’est un </a:t>
+            </a:r>
+            <a:r>
+              <a:rPr lang="fr-FR" sz="1200" i="1" dirty="0" err="1" smtClean="0">
+                <a:cs typeface="Courier New" panose="02070309020205020404" pitchFamily="49" charset="0"/>
+              </a:rPr>
+              <a:t>callable</a:t>
+            </a:r>
+            <a:r>
+              <a:rPr lang="fr-FR" sz="1200" dirty="0" smtClean="0">
+                <a:cs typeface="Courier New" panose="02070309020205020404" pitchFamily="49" charset="0"/>
+              </a:rPr>
+              <a:t> qui prend comme argument la fonction décorée et produit un </a:t>
+            </a:r>
+            <a:r>
+              <a:rPr lang="fr-FR" sz="1200" i="1" dirty="0" err="1" smtClean="0">
+                <a:cs typeface="Courier New" panose="02070309020205020404" pitchFamily="49" charset="0"/>
+              </a:rPr>
+              <a:t>callable</a:t>
+            </a:r>
+            <a:r>
+              <a:rPr lang="fr-FR" sz="1200" dirty="0" smtClean="0">
+                <a:cs typeface="Courier New" panose="02070309020205020404" pitchFamily="49" charset="0"/>
+              </a:rPr>
+              <a:t> qui prend le même nombre d’arguments que la fonction décorée !</a:t>
+            </a:r>
           </a:p>
           <a:p>
             <a:pPr marL="0" marR="0" indent="0" algn="l" defTabSz="914400" rtl="0" eaLnBrk="0" fontAlgn="base" latinLnBrk="0" hangingPunct="0">
@@ -1941,38 +1786,7 @@
               <a:tabLst/>
               <a:defRPr/>
             </a:pPr>
-            <a:r>
-              <a:rPr lang="fr-FR" dirty="0" smtClean="0"/>
-              <a:t>Il faut faire la distinction entre la syntaxe</a:t>
-            </a:r>
-            <a:r>
-              <a:rPr lang="fr-FR" baseline="0" dirty="0" smtClean="0"/>
-              <a:t> @</a:t>
-            </a:r>
-            <a:r>
-              <a:rPr lang="fr-FR" baseline="0" dirty="0" err="1" smtClean="0"/>
-              <a:t>decorateur</a:t>
-            </a:r>
-            <a:r>
-              <a:rPr lang="fr-FR" baseline="0" dirty="0" smtClean="0"/>
-              <a:t> qui est juste un raccourci pour écrire f  = </a:t>
-            </a:r>
-            <a:r>
-              <a:rPr lang="fr-FR" baseline="0" dirty="0" err="1" smtClean="0"/>
-              <a:t>decorateur</a:t>
-            </a:r>
-            <a:r>
-              <a:rPr lang="fr-FR" baseline="0" dirty="0" smtClean="0"/>
-              <a:t>(f) et la concept de </a:t>
-            </a:r>
-            <a:r>
-              <a:rPr lang="fr-FR" baseline="0" dirty="0" err="1" smtClean="0"/>
-              <a:t>decoration</a:t>
-            </a:r>
-            <a:r>
-              <a:rPr lang="fr-FR" baseline="0" dirty="0" smtClean="0"/>
-              <a:t>. La syntaxe est juste là pour rendre plus clair qu’une fonction est décorée, il n’y a rien de profond ici. Par contre, </a:t>
-            </a:r>
+            <a:endParaRPr lang="fr-FR" dirty="0" smtClean="0"/>
           </a:p>
           <a:p>
             <a:pPr marL="0" marR="0" indent="0" algn="l" defTabSz="914400" rtl="0" eaLnBrk="0" fontAlgn="base" latinLnBrk="0" hangingPunct="0">
@@ -1993,9 +1807,87 @@
               <a:defRPr/>
             </a:pPr>
             <a:r>
+              <a:rPr lang="fr-FR" dirty="0" smtClean="0"/>
+              <a:t>Un</a:t>
+            </a:r>
+            <a:r>
               <a:rPr lang="fr-FR" baseline="0" dirty="0" smtClean="0"/>
-              <a:t>La concept de décorateur est complexe et très puissant puisque l’on peut implémenter ses propres décorateurs. </a:t>
-            </a:r>
+              <a:t> décorateur peut donc être une fonction ou une classe et retourner une fonction ou une classe. Souvent, le décorateur retourne directement l’objet décoré, mais il peut également retourner n’importe quel objet </a:t>
+            </a:r>
+            <a:r>
+              <a:rPr lang="fr-FR" baseline="0" dirty="0" err="1" smtClean="0"/>
+              <a:t>callable</a:t>
+            </a:r>
+            <a:r>
+              <a:rPr lang="fr-FR" baseline="0" dirty="0" smtClean="0"/>
+              <a:t>. </a:t>
+            </a:r>
+          </a:p>
+          <a:p>
+            <a:pPr marL="0" marR="0" indent="0" algn="l" defTabSz="914400" rtl="0" eaLnBrk="0" fontAlgn="base" latinLnBrk="0" hangingPunct="0">
+              <a:lnSpc>
+                <a:spcPct val="100000"/>
+              </a:lnSpc>
+              <a:spcBef>
+                <a:spcPct val="30000"/>
+              </a:spcBef>
+              <a:spcAft>
+                <a:spcPct val="0"/>
+              </a:spcAft>
+              <a:buClrTx/>
+              <a:buSzTx/>
+              <a:buFontTx/>
+              <a:buNone/>
+              <a:tabLst/>
+              <a:defRPr/>
+            </a:pPr>
+            <a:r>
+              <a:rPr lang="fr-FR" baseline="0" dirty="0" smtClean="0"/>
+              <a:t>f(a, b) </a:t>
+            </a:r>
+            <a:r>
+              <a:rPr lang="fr-FR" baseline="0" dirty="0" smtClean="0">
+                <a:sym typeface="Wingdings" panose="05000000000000000000" pitchFamily="2" charset="2"/>
+              </a:rPr>
+              <a:t> </a:t>
+            </a:r>
+            <a:r>
+              <a:rPr lang="fr-FR" baseline="0" dirty="0" err="1" smtClean="0">
+                <a:sym typeface="Wingdings" panose="05000000000000000000" pitchFamily="2" charset="2"/>
+              </a:rPr>
+              <a:t>decorateur</a:t>
+            </a:r>
+            <a:r>
+              <a:rPr lang="fr-FR" baseline="0" dirty="0" smtClean="0">
+                <a:sym typeface="Wingdings" panose="05000000000000000000" pitchFamily="2" charset="2"/>
+              </a:rPr>
+              <a:t>(f)(</a:t>
+            </a:r>
+            <a:r>
+              <a:rPr lang="fr-FR" baseline="0" dirty="0" err="1" smtClean="0">
+                <a:sym typeface="Wingdings" panose="05000000000000000000" pitchFamily="2" charset="2"/>
+              </a:rPr>
+              <a:t>a,b</a:t>
+            </a:r>
+            <a:r>
+              <a:rPr lang="fr-FR" baseline="0" dirty="0" smtClean="0">
+                <a:sym typeface="Wingdings" panose="05000000000000000000" pitchFamily="2" charset="2"/>
+              </a:rPr>
+              <a:t>). L’</a:t>
+            </a:r>
+            <a:r>
+              <a:rPr lang="fr-FR" baseline="0" dirty="0" err="1" smtClean="0">
+                <a:sym typeface="Wingdings" panose="05000000000000000000" pitchFamily="2" charset="2"/>
+              </a:rPr>
+              <a:t>équivallence</a:t>
+            </a:r>
+            <a:r>
+              <a:rPr lang="fr-FR" baseline="0" dirty="0" smtClean="0">
+                <a:sym typeface="Wingdings" panose="05000000000000000000" pitchFamily="2" charset="2"/>
+              </a:rPr>
+              <a:t> est lorsque f est décorée par le décorateur</a:t>
+            </a:r>
+            <a:endParaRPr lang="fr-FR" dirty="0"/>
           </a:p>
         </p:txBody>
       </p:sp>
@@ -2022,7 +1914,7 @@
               <a:pPr>
                 <a:defRPr/>
               </a:pPr>
-              <a:t>8</a:t>
+              <a:t>7</a:t>
             </a:fld>
             <a:endParaRPr lang="en-US"/>
           </a:p>
@@ -2031,7 +1923,7 @@
     </p:spTree>
     <p:extLst>
       <p:ext uri="{BB962C8B-B14F-4D97-AF65-F5344CB8AC3E}">
-        <p14:creationId xmlns:p14="http://schemas.microsoft.com/office/powerpoint/2010/main" val="3643535726"/>
+        <p14:creationId xmlns:p14="http://schemas.microsoft.com/office/powerpoint/2010/main" val="3737740062"/>
       </p:ext>
     </p:extLst>
   </p:cSld>
@@ -2085,15 +1977,125 @@
           <a:bodyPr/>
           <a:lstStyle/>
           <a:p>
+            <a:pPr marL="0" marR="0" indent="0" algn="l" defTabSz="914400" rtl="0" eaLnBrk="0" fontAlgn="base" latinLnBrk="0" hangingPunct="0">
+              <a:lnSpc>
+                <a:spcPct val="100000"/>
+              </a:lnSpc>
+              <a:spcBef>
+                <a:spcPct val="30000"/>
+              </a:spcBef>
+              <a:spcAft>
+                <a:spcPct val="0"/>
+              </a:spcAft>
+              <a:buClrTx/>
+              <a:buSzTx/>
+              <a:buFontTx/>
+              <a:buNone/>
+              <a:tabLst/>
+              <a:defRPr/>
+            </a:pPr>
             <a:r>
               <a:rPr lang="fr-FR" dirty="0" smtClean="0"/>
-              <a:t>La syntaxe décorateur n’est pas nécessaire pour avoir des décorateurs, mais elle simplifie</a:t>
+              <a:t>Voic</a:t>
             </a:r>
             <a:r>
               <a:rPr lang="fr-FR" baseline="0" dirty="0" smtClean="0"/>
-              <a:t> l’utilisation en définissant une syntaxe explicite.</a:t>
-            </a:r>
-            <a:endParaRPr lang="fr-FR" dirty="0"/>
+              <a:t>i la syntaxe générale d’un décorateur. </a:t>
+            </a:r>
+          </a:p>
+          <a:p>
+            <a:pPr marL="0" marR="0" indent="0" algn="l" defTabSz="914400" rtl="0" eaLnBrk="0" fontAlgn="base" latinLnBrk="0" hangingPunct="0">
+              <a:lnSpc>
+                <a:spcPct val="100000"/>
+              </a:lnSpc>
+              <a:spcBef>
+                <a:spcPct val="30000"/>
+              </a:spcBef>
+              <a:spcAft>
+                <a:spcPct val="0"/>
+              </a:spcAft>
+              <a:buClrTx/>
+              <a:buSzTx/>
+              <a:buFontTx/>
+              <a:buNone/>
+              <a:tabLst/>
+              <a:defRPr/>
+            </a:pPr>
+            <a:endParaRPr lang="fr-FR" dirty="0" smtClean="0"/>
+          </a:p>
+          <a:p>
+            <a:pPr marL="0" marR="0" indent="0" algn="l" defTabSz="914400" rtl="0" eaLnBrk="0" fontAlgn="base" latinLnBrk="0" hangingPunct="0">
+              <a:lnSpc>
+                <a:spcPct val="100000"/>
+              </a:lnSpc>
+              <a:spcBef>
+                <a:spcPct val="30000"/>
+              </a:spcBef>
+              <a:spcAft>
+                <a:spcPct val="0"/>
+              </a:spcAft>
+              <a:buClrTx/>
+              <a:buSzTx/>
+              <a:buFontTx/>
+              <a:buNone/>
+              <a:tabLst/>
+              <a:defRPr/>
+            </a:pPr>
+            <a:r>
+              <a:rPr lang="fr-FR" dirty="0" smtClean="0"/>
+              <a:t>Il faut faire la distinction entre la syntaxe</a:t>
+            </a:r>
+            <a:r>
+              <a:rPr lang="fr-FR" baseline="0" dirty="0" smtClean="0"/>
+              <a:t> @</a:t>
+            </a:r>
+            <a:r>
+              <a:rPr lang="fr-FR" baseline="0" dirty="0" err="1" smtClean="0"/>
+              <a:t>decorateur</a:t>
+            </a:r>
+            <a:r>
+              <a:rPr lang="fr-FR" baseline="0" dirty="0" smtClean="0"/>
+              <a:t> qui est juste un raccourci pour écrire f  = </a:t>
+            </a:r>
+            <a:r>
+              <a:rPr lang="fr-FR" baseline="0" dirty="0" err="1" smtClean="0"/>
+              <a:t>decorateur</a:t>
+            </a:r>
+            <a:r>
+              <a:rPr lang="fr-FR" baseline="0" dirty="0" smtClean="0"/>
+              <a:t>(f) et la concept de </a:t>
+            </a:r>
+            <a:r>
+              <a:rPr lang="fr-FR" baseline="0" dirty="0" err="1" smtClean="0"/>
+              <a:t>decoration</a:t>
+            </a:r>
+            <a:r>
+              <a:rPr lang="fr-FR" baseline="0" dirty="0" smtClean="0"/>
+              <a:t>. La syntaxe est juste là pour rendre plus clair qu’une fonction est décorée, il n’y a rien de profond ici. Par contre, </a:t>
+            </a:r>
+          </a:p>
+          <a:p>
+            <a:pPr marL="0" marR="0" indent="0" algn="l" defTabSz="914400" rtl="0" eaLnBrk="0" fontAlgn="base" latinLnBrk="0" hangingPunct="0">
+              <a:lnSpc>
+                <a:spcPct val="100000"/>
+              </a:lnSpc>
+              <a:spcBef>
+                <a:spcPct val="30000"/>
+              </a:spcBef>
+              <a:spcAft>
+                <a:spcPct val="0"/>
+              </a:spcAft>
+              <a:buClrTx/>
+              <a:buSzTx/>
+              <a:buFontTx/>
+              <a:buNone/>
+              <a:tabLst/>
+              <a:defRPr/>
+            </a:pPr>
+            <a:r>
+              <a:rPr lang="fr-FR" baseline="0" dirty="0" smtClean="0"/>
+              <a:t>La concept de décorateur est complexe et très puissant puisque l’on peut implémenter ses propres décorateurs. </a:t>
+            </a:r>
           </a:p>
         </p:txBody>
       </p:sp>
@@ -2129,7 +2131,7 @@
     </p:spTree>
     <p:extLst>
       <p:ext uri="{BB962C8B-B14F-4D97-AF65-F5344CB8AC3E}">
-        <p14:creationId xmlns:p14="http://schemas.microsoft.com/office/powerpoint/2010/main" val="2810502160"/>
+        <p14:creationId xmlns:p14="http://schemas.microsoft.com/office/powerpoint/2010/main" val="3643535726"/>
       </p:ext>
     </p:extLst>
   </p:cSld>
@@ -2183,138 +2185,15 @@
           <a:bodyPr/>
           <a:lstStyle/>
           <a:p>
-            <a:pPr marL="0" indent="0">
-              <a:buNone/>
-            </a:pPr>
-            <a:r>
-              <a:rPr lang="fr-FR" sz="1200" dirty="0" smtClean="0">
-                <a:latin typeface="Courier New" panose="02070309020205020404" pitchFamily="49" charset="0"/>
-                <a:cs typeface="Courier New" panose="02070309020205020404" pitchFamily="49" charset="0"/>
-              </a:rPr>
-              <a:t>g(a, b) appelle la</a:t>
-            </a:r>
-            <a:r>
-              <a:rPr lang="fr-FR" sz="1200" baseline="0" dirty="0" smtClean="0">
-                <a:latin typeface="Courier New" panose="02070309020205020404" pitchFamily="49" charset="0"/>
-                <a:cs typeface="Courier New" panose="02070309020205020404" pitchFamily="49" charset="0"/>
-              </a:rPr>
-              <a:t> méthode __call__ de l’instance retournée par </a:t>
-            </a:r>
-            <a:r>
-              <a:rPr lang="fr-FR" sz="1200" baseline="0" dirty="0" err="1" smtClean="0">
-                <a:latin typeface="Courier New" panose="02070309020205020404" pitchFamily="49" charset="0"/>
-                <a:cs typeface="Courier New" panose="02070309020205020404" pitchFamily="49" charset="0"/>
-              </a:rPr>
-              <a:t>NbAppel</a:t>
-            </a:r>
-            <a:r>
-              <a:rPr lang="fr-FR" sz="1200" baseline="0" dirty="0" smtClean="0">
-                <a:latin typeface="Courier New" panose="02070309020205020404" pitchFamily="49" charset="0"/>
-                <a:cs typeface="Courier New" panose="02070309020205020404" pitchFamily="49" charset="0"/>
-              </a:rPr>
-              <a:t>(g)</a:t>
-            </a:r>
-            <a:endParaRPr lang="fr-FR" sz="1200" dirty="0" smtClean="0">
-              <a:latin typeface="Courier New" panose="02070309020205020404" pitchFamily="49" charset="0"/>
-              <a:cs typeface="Courier New" panose="02070309020205020404" pitchFamily="49" charset="0"/>
-            </a:endParaRPr>
-          </a:p>
-          <a:p>
-            <a:pPr marL="0" indent="0">
-              <a:buNone/>
-            </a:pPr>
-            <a:endParaRPr lang="fr-FR" sz="1200" dirty="0" smtClean="0">
-              <a:latin typeface="Courier New" panose="02070309020205020404" pitchFamily="49" charset="0"/>
-              <a:cs typeface="Courier New" panose="02070309020205020404" pitchFamily="49" charset="0"/>
-            </a:endParaRPr>
-          </a:p>
-          <a:p>
-            <a:pPr marL="0" indent="0">
-              <a:buNone/>
-            </a:pPr>
-            <a:r>
-              <a:rPr lang="fr-FR" sz="1200" dirty="0" smtClean="0">
-                <a:latin typeface="Courier New" panose="02070309020205020404" pitchFamily="49" charset="0"/>
-                <a:cs typeface="Courier New" panose="02070309020205020404" pitchFamily="49" charset="0"/>
-              </a:rPr>
-              <a:t>@</a:t>
-            </a:r>
-            <a:r>
-              <a:rPr lang="fr-FR" sz="1200" dirty="0" err="1" smtClean="0">
-                <a:latin typeface="Courier New" panose="02070309020205020404" pitchFamily="49" charset="0"/>
-                <a:cs typeface="Courier New" panose="02070309020205020404" pitchFamily="49" charset="0"/>
-              </a:rPr>
-              <a:t>NbAppel</a:t>
-            </a:r>
-            <a:endParaRPr lang="fr-FR" sz="1200" dirty="0" smtClean="0">
-              <a:latin typeface="Courier New" panose="02070309020205020404" pitchFamily="49" charset="0"/>
-              <a:cs typeface="Courier New" panose="02070309020205020404" pitchFamily="49" charset="0"/>
-            </a:endParaRPr>
-          </a:p>
-          <a:p>
-            <a:pPr marL="0" indent="0">
-              <a:buNone/>
-            </a:pPr>
-            <a:r>
-              <a:rPr lang="fr-FR" sz="1200" dirty="0" err="1" smtClean="0">
-                <a:latin typeface="Courier New" panose="02070309020205020404" pitchFamily="49" charset="0"/>
-                <a:cs typeface="Courier New" panose="02070309020205020404" pitchFamily="49" charset="0"/>
-              </a:rPr>
-              <a:t>def</a:t>
-            </a:r>
-            <a:r>
-              <a:rPr lang="fr-FR" sz="1200" dirty="0" smtClean="0">
-                <a:latin typeface="Courier New" panose="02070309020205020404" pitchFamily="49" charset="0"/>
-                <a:cs typeface="Courier New" panose="02070309020205020404" pitchFamily="49" charset="0"/>
-              </a:rPr>
-              <a:t> h(a, b, c):</a:t>
-            </a:r>
-          </a:p>
-          <a:p>
-            <a:pPr marL="0" indent="0">
-              <a:buNone/>
-            </a:pPr>
-            <a:r>
-              <a:rPr lang="fr-FR" sz="1200" dirty="0" smtClean="0">
-                <a:latin typeface="Courier New" panose="02070309020205020404" pitchFamily="49" charset="0"/>
-                <a:cs typeface="Courier New" panose="02070309020205020404" pitchFamily="49" charset="0"/>
-              </a:rPr>
-              <a:t>    </a:t>
-            </a:r>
-            <a:r>
-              <a:rPr lang="fr-FR" sz="1200" dirty="0" err="1" smtClean="0">
-                <a:latin typeface="Courier New" panose="02070309020205020404" pitchFamily="49" charset="0"/>
-                <a:cs typeface="Courier New" panose="02070309020205020404" pitchFamily="49" charset="0"/>
-              </a:rPr>
-              <a:t>print</a:t>
-            </a:r>
-            <a:r>
-              <a:rPr lang="fr-FR" sz="1200" dirty="0" smtClean="0">
-                <a:latin typeface="Courier New" panose="02070309020205020404" pitchFamily="49" charset="0"/>
-                <a:cs typeface="Courier New" panose="02070309020205020404" pitchFamily="49" charset="0"/>
-              </a:rPr>
-              <a:t> a, b, c</a:t>
-            </a:r>
-          </a:p>
-          <a:p>
-            <a:pPr marL="0" marR="0" indent="0" algn="l" defTabSz="914400" rtl="0" eaLnBrk="0" fontAlgn="base" latinLnBrk="0" hangingPunct="0">
-              <a:lnSpc>
-                <a:spcPct val="100000"/>
-              </a:lnSpc>
-              <a:spcBef>
-                <a:spcPct val="30000"/>
-              </a:spcBef>
-              <a:spcAft>
-                <a:spcPct val="0"/>
-              </a:spcAft>
-              <a:buClrTx/>
-              <a:buSzTx/>
-              <a:buFontTx/>
-              <a:buNone/>
-              <a:tabLst/>
-              <a:defRPr/>
-            </a:pPr>
-            <a:endParaRPr lang="fr-FR" baseline="0" dirty="0" smtClean="0"/>
+            <a:r>
+              <a:rPr lang="fr-FR" dirty="0" smtClean="0"/>
+              <a:t>La syntaxe décorateur n’est pas nécessaire pour avoir des décorateurs, mais elle simplifie</a:t>
+            </a:r>
+            <a:r>
+              <a:rPr lang="fr-FR" baseline="0" dirty="0" smtClean="0"/>
+              <a:t> l’utilisation en définissant une syntaxe explicite.</a:t>
+            </a:r>
+            <a:endParaRPr lang="fr-FR" dirty="0"/>
           </a:p>
         </p:txBody>
       </p:sp>
@@ -2342,6 +2221,227 @@
                 <a:defRPr/>
               </a:pPr>
               <a:t>10</a:t>
+            </a:fld>
+            <a:endParaRPr lang="en-US"/>
+          </a:p>
+        </p:txBody>
+      </p:sp>
+    </p:spTree>
+    <p:extLst>
+      <p:ext uri="{BB962C8B-B14F-4D97-AF65-F5344CB8AC3E}">
+        <p14:creationId xmlns:p14="http://schemas.microsoft.com/office/powerpoint/2010/main" val="2810502160"/>
+      </p:ext>
+    </p:extLst>
+  </p:cSld>
+  <p:clrMapOvr>
+    <a:masterClrMapping/>
+  </p:clrMapOvr>
+</p:notes>
+</file>
+
+<file path=ppt/notesSlides/notesSlide9.xml><?xml version="1.0" encoding="utf-8"?>
+<p:notes xmlns:a="http://schemas.openxmlformats.org/drawingml/2006/main" xmlns:r="http://schemas.openxmlformats.org/officeDocument/2006/relationships" xmlns:p="http://schemas.openxmlformats.org/presentationml/2006/main">
+  <p:cSld>
+    <p:spTree>
+      <p:nvGrpSpPr>
+        <p:cNvPr id="1" name=""/>
+        <p:cNvGrpSpPr/>
+        <p:nvPr/>
+      </p:nvGrpSpPr>
+      <p:grpSpPr>
+        <a:xfrm>
+          <a:off x="0" y="0"/>
+          <a:ext cx="0" cy="0"/>
+          <a:chOff x="0" y="0"/>
+          <a:chExt cx="0" cy="0"/>
+        </a:xfrm>
+      </p:grpSpPr>
+      <p:sp>
+        <p:nvSpPr>
+          <p:cNvPr id="2" name="Espace réservé de l'image des diapositives 1"/>
+          <p:cNvSpPr>
+            <a:spLocks noGrp="1" noRot="1" noChangeAspect="1"/>
+          </p:cNvSpPr>
+          <p:nvPr>
+            <p:ph type="sldImg"/>
+          </p:nvPr>
+        </p:nvSpPr>
+        <p:spPr/>
+      </p:sp>
+      <p:sp>
+        <p:nvSpPr>
+          <p:cNvPr id="3" name="Espace réservé des commentaires 2"/>
+          <p:cNvSpPr>
+            <a:spLocks noGrp="1"/>
+          </p:cNvSpPr>
+          <p:nvPr>
+            <p:ph type="body" idx="1"/>
+          </p:nvPr>
+        </p:nvSpPr>
+        <p:spPr/>
+        <p:txBody>
+          <a:bodyPr/>
+          <a:lstStyle/>
+          <a:p>
+            <a:pPr marL="0" indent="0">
+              <a:buNone/>
+            </a:pPr>
+            <a:r>
+              <a:rPr lang="fr-FR" sz="1200" dirty="0" smtClean="0">
+                <a:latin typeface="Courier New" panose="02070309020205020404" pitchFamily="49" charset="0"/>
+                <a:cs typeface="Courier New" panose="02070309020205020404" pitchFamily="49" charset="0"/>
+              </a:rPr>
+              <a:t>g(a, b) appelle la</a:t>
+            </a:r>
+            <a:r>
+              <a:rPr lang="fr-FR" sz="1200" baseline="0" dirty="0" smtClean="0">
+                <a:latin typeface="Courier New" panose="02070309020205020404" pitchFamily="49" charset="0"/>
+                <a:cs typeface="Courier New" panose="02070309020205020404" pitchFamily="49" charset="0"/>
+              </a:rPr>
+              <a:t> méthode __call__ de l’instance retournée par </a:t>
+            </a:r>
+            <a:r>
+              <a:rPr lang="fr-FR" sz="1200" baseline="0" dirty="0" err="1" smtClean="0">
+                <a:latin typeface="Courier New" panose="02070309020205020404" pitchFamily="49" charset="0"/>
+                <a:cs typeface="Courier New" panose="02070309020205020404" pitchFamily="49" charset="0"/>
+              </a:rPr>
+              <a:t>NbAppel</a:t>
+            </a:r>
+            <a:r>
+              <a:rPr lang="fr-FR" sz="1200" baseline="0" dirty="0" smtClean="0">
+                <a:latin typeface="Courier New" panose="02070309020205020404" pitchFamily="49" charset="0"/>
+                <a:cs typeface="Courier New" panose="02070309020205020404" pitchFamily="49" charset="0"/>
+              </a:rPr>
+              <a:t>(g)</a:t>
+            </a:r>
+            <a:endParaRPr lang="fr-FR" sz="1200" dirty="0" smtClean="0">
+              <a:latin typeface="Courier New" panose="02070309020205020404" pitchFamily="49" charset="0"/>
+              <a:cs typeface="Courier New" panose="02070309020205020404" pitchFamily="49" charset="0"/>
+            </a:endParaRPr>
+          </a:p>
+          <a:p>
+            <a:pPr marL="0" indent="0">
+              <a:buNone/>
+            </a:pPr>
+            <a:endParaRPr lang="fr-FR" sz="1200" dirty="0" smtClean="0">
+              <a:latin typeface="Courier New" panose="02070309020205020404" pitchFamily="49" charset="0"/>
+              <a:cs typeface="Courier New" panose="02070309020205020404" pitchFamily="49" charset="0"/>
+            </a:endParaRPr>
+          </a:p>
+          <a:p>
+            <a:pPr marL="0" indent="0">
+              <a:buNone/>
+            </a:pPr>
+            <a:r>
+              <a:rPr lang="fr-FR" sz="1200" dirty="0" smtClean="0">
+                <a:latin typeface="Courier New" panose="02070309020205020404" pitchFamily="49" charset="0"/>
+                <a:cs typeface="Courier New" panose="02070309020205020404" pitchFamily="49" charset="0"/>
+              </a:rPr>
+              <a:t>@</a:t>
+            </a:r>
+            <a:r>
+              <a:rPr lang="fr-FR" sz="1200" dirty="0" err="1" smtClean="0">
+                <a:latin typeface="Courier New" panose="02070309020205020404" pitchFamily="49" charset="0"/>
+                <a:cs typeface="Courier New" panose="02070309020205020404" pitchFamily="49" charset="0"/>
+              </a:rPr>
+              <a:t>NbAppel</a:t>
+            </a:r>
+            <a:endParaRPr lang="fr-FR" sz="1200" dirty="0" smtClean="0">
+              <a:latin typeface="Courier New" panose="02070309020205020404" pitchFamily="49" charset="0"/>
+              <a:cs typeface="Courier New" panose="02070309020205020404" pitchFamily="49" charset="0"/>
+            </a:endParaRPr>
+          </a:p>
+          <a:p>
+            <a:pPr marL="0" indent="0">
+              <a:buNone/>
+            </a:pPr>
+            <a:r>
+              <a:rPr lang="fr-FR" sz="1200" dirty="0" err="1" smtClean="0">
+                <a:latin typeface="Courier New" panose="02070309020205020404" pitchFamily="49" charset="0"/>
+                <a:cs typeface="Courier New" panose="02070309020205020404" pitchFamily="49" charset="0"/>
+              </a:rPr>
+              <a:t>def</a:t>
+            </a:r>
+            <a:r>
+              <a:rPr lang="fr-FR" sz="1200" dirty="0" smtClean="0">
+                <a:latin typeface="Courier New" panose="02070309020205020404" pitchFamily="49" charset="0"/>
+                <a:cs typeface="Courier New" panose="02070309020205020404" pitchFamily="49" charset="0"/>
+              </a:rPr>
+              <a:t> h(a, b, c):</a:t>
+            </a:r>
+          </a:p>
+          <a:p>
+            <a:pPr marL="0" indent="0">
+              <a:buNone/>
+            </a:pPr>
+            <a:r>
+              <a:rPr lang="fr-FR" sz="1200" dirty="0" smtClean="0">
+                <a:latin typeface="Courier New" panose="02070309020205020404" pitchFamily="49" charset="0"/>
+                <a:cs typeface="Courier New" panose="02070309020205020404" pitchFamily="49" charset="0"/>
+              </a:rPr>
+              <a:t>    </a:t>
+            </a:r>
+            <a:r>
+              <a:rPr lang="fr-FR" sz="1200" dirty="0" err="1" smtClean="0">
+                <a:latin typeface="Courier New" panose="02070309020205020404" pitchFamily="49" charset="0"/>
+                <a:cs typeface="Courier New" panose="02070309020205020404" pitchFamily="49" charset="0"/>
+              </a:rPr>
+              <a:t>print</a:t>
+            </a:r>
+            <a:r>
+              <a:rPr lang="fr-FR" sz="1200" dirty="0" smtClean="0">
+                <a:latin typeface="Courier New" panose="02070309020205020404" pitchFamily="49" charset="0"/>
+                <a:cs typeface="Courier New" panose="02070309020205020404" pitchFamily="49" charset="0"/>
+              </a:rPr>
+              <a:t> a, b, c</a:t>
+            </a:r>
+          </a:p>
+          <a:p>
+            <a:pPr marL="0" marR="0" indent="0" algn="l" defTabSz="914400" rtl="0" eaLnBrk="0" fontAlgn="base" latinLnBrk="0" hangingPunct="0">
+              <a:lnSpc>
+                <a:spcPct val="100000"/>
+              </a:lnSpc>
+              <a:spcBef>
+                <a:spcPct val="30000"/>
+              </a:spcBef>
+              <a:spcAft>
+                <a:spcPct val="0"/>
+              </a:spcAft>
+              <a:buClrTx/>
+              <a:buSzTx/>
+              <a:buFontTx/>
+              <a:buNone/>
+              <a:tabLst/>
+              <a:defRPr/>
+            </a:pPr>
+            <a:endParaRPr lang="fr-FR" baseline="0" dirty="0" smtClean="0"/>
+          </a:p>
+        </p:txBody>
+      </p:sp>
+      <p:sp>
+        <p:nvSpPr>
+          <p:cNvPr id="4" name="Espace réservé du numéro de diapositive 3"/>
+          <p:cNvSpPr>
+            <a:spLocks noGrp="1"/>
+          </p:cNvSpPr>
+          <p:nvPr>
+            <p:ph type="sldNum" sz="quarter" idx="10"/>
+          </p:nvPr>
+        </p:nvSpPr>
+        <p:spPr/>
+        <p:txBody>
+          <a:bodyPr/>
+          <a:lstStyle/>
+          <a:p>
+            <a:pPr>
+              <a:defRPr/>
+            </a:pPr>
+            <a:fld id="{9E8EB9F5-F2F7-4A48-A943-9B409357C15C}" type="slidenum">
+              <a:rPr lang="en-US" smtClean="0"/>
+              <a:pPr>
+                <a:defRPr/>
+              </a:pPr>
+              <a:t>11</a:t>
             </a:fld>
             <a:endParaRPr lang="en-US"/>
           </a:p>
@@ -5716,6 +5816,189 @@
 </file>
 
 <file path=ppt/slides/slide10.xml><?xml version="1.0" encoding="utf-8"?>
+<p:sld xmlns:a="http://schemas.openxmlformats.org/drawingml/2006/main" xmlns:r="http://schemas.openxmlformats.org/officeDocument/2006/relationships" xmlns:p="http://schemas.openxmlformats.org/presentationml/2006/main">
+  <p:cSld>
+    <p:spTree>
+      <p:nvGrpSpPr>
+        <p:cNvPr id="1" name=""/>
+        <p:cNvGrpSpPr/>
+        <p:nvPr/>
+      </p:nvGrpSpPr>
+      <p:grpSpPr>
+        <a:xfrm>
+          <a:off x="0" y="0"/>
+          <a:ext cx="0" cy="0"/>
+          <a:chOff x="0" y="0"/>
+          <a:chExt cx="0" cy="0"/>
+        </a:xfrm>
+      </p:grpSpPr>
+      <p:sp>
+        <p:nvSpPr>
+          <p:cNvPr id="5" name="ZoneTexte 4"/>
+          <p:cNvSpPr txBox="1"/>
+          <p:nvPr/>
+        </p:nvSpPr>
+        <p:spPr>
+          <a:xfrm>
+            <a:off x="401444" y="428892"/>
+            <a:ext cx="11106614" cy="4093428"/>
+          </a:xfrm>
+          <a:prstGeom prst="rect">
+            <a:avLst/>
+          </a:prstGeom>
+          <a:noFill/>
+        </p:spPr>
+        <p:txBody>
+          <a:bodyPr wrap="square" rtlCol="0">
+            <a:spAutoFit/>
+          </a:bodyPr>
+          <a:lstStyle/>
+          <a:p>
+            <a:r>
+              <a:rPr lang="fr-FR" sz="6000" dirty="0" smtClean="0">
+                <a:latin typeface="Calibri" panose="020F0502020204030204" pitchFamily="34" charset="0"/>
+              </a:rPr>
+              <a:t>À quoi sert un décorateur ?</a:t>
+            </a:r>
+          </a:p>
+          <a:p>
+            <a:endParaRPr lang="fr-FR" sz="2000" i="1" dirty="0">
+              <a:latin typeface="Calibri" panose="020F0502020204030204" pitchFamily="34" charset="0"/>
+            </a:endParaRPr>
+          </a:p>
+          <a:p>
+            <a:r>
+              <a:rPr lang="fr-FR" sz="6000" dirty="0" smtClean="0">
+                <a:latin typeface="Calibri" panose="020F0502020204030204" pitchFamily="34" charset="0"/>
+              </a:rPr>
+              <a:t>À ajouter une couche de logique à une fonction avec une syntaxe explicite </a:t>
+            </a:r>
+            <a:r>
+              <a:rPr lang="fr-FR" sz="6000" dirty="0" smtClean="0">
+                <a:latin typeface="Courier New" panose="02070309020205020404" pitchFamily="49" charset="0"/>
+                <a:cs typeface="Courier New" panose="02070309020205020404" pitchFamily="49" charset="0"/>
+              </a:rPr>
+              <a:t>@</a:t>
+            </a:r>
+            <a:r>
+              <a:rPr lang="fr-FR" sz="6000" dirty="0" err="1" smtClean="0">
+                <a:latin typeface="Courier New" panose="02070309020205020404" pitchFamily="49" charset="0"/>
+                <a:cs typeface="Courier New" panose="02070309020205020404" pitchFamily="49" charset="0"/>
+              </a:rPr>
+              <a:t>decorateur</a:t>
+            </a:r>
+            <a:endParaRPr lang="fr-FR" sz="6000" dirty="0">
+              <a:latin typeface="Courier New" panose="02070309020205020404" pitchFamily="49" charset="0"/>
+              <a:cs typeface="Courier New" panose="02070309020205020404" pitchFamily="49" charset="0"/>
+            </a:endParaRPr>
+          </a:p>
+        </p:txBody>
+      </p:sp>
+    </p:spTree>
+    <p:extLst>
+      <p:ext uri="{BB962C8B-B14F-4D97-AF65-F5344CB8AC3E}">
+        <p14:creationId xmlns:p14="http://schemas.microsoft.com/office/powerpoint/2010/main" val="921741580"/>
+      </p:ext>
+    </p:extLst>
+  </p:cSld>
+  <p:clrMapOvr>
+    <a:masterClrMapping/>
+  </p:clrMapOvr>
+  <p:timing>
+    <p:tnLst>
+      <p:par>
+        <p:cTn id="1" dur="indefinite" restart="never" nodeType="tmRoot">
+          <p:childTnLst>
+            <p:seq concurrent="1" nextAc="seek">
+              <p:cTn id="2" dur="indefinite" nodeType="mainSeq">
+                <p:childTnLst>
+                  <p:par>
+                    <p:cTn id="3" fill="hold">
+                      <p:stCondLst>
+                        <p:cond delay="indefinite"/>
+                      </p:stCondLst>
+                      <p:childTnLst>
+                        <p:par>
+                          <p:cTn id="4" fill="hold">
+                            <p:stCondLst>
+                              <p:cond delay="0"/>
+                            </p:stCondLst>
+                            <p:childTnLst>
+                              <p:par>
+                                <p:cTn id="5" presetID="10" presetClass="entr" presetSubtype="0" fill="hold" nodeType="clickEffect">
+                                  <p:stCondLst>
+                                    <p:cond delay="0"/>
+                                  </p:stCondLst>
+                                  <p:childTnLst>
+                                    <p:set>
+                                      <p:cBhvr>
+                                        <p:cTn id="6" dur="1" fill="hold">
+                                          <p:stCondLst>
+                                            <p:cond delay="0"/>
+                                          </p:stCondLst>
+                                        </p:cTn>
+                                        <p:tgtEl>
+                                          <p:spTgt spid="5">
+                                            <p:txEl>
+                                              <p:pRg st="2" end="2"/>
+                                            </p:txEl>
+                                          </p:spTgt>
+                                        </p:tgtEl>
+                                        <p:attrNameLst>
+                                          <p:attrName>style.visibility</p:attrName>
+                                        </p:attrNameLst>
+                                      </p:cBhvr>
+                                      <p:to>
+                                        <p:strVal val="visible"/>
+                                      </p:to>
+                                    </p:set>
+                                    <p:animEffect transition="in" filter="fade">
+                                      <p:cBhvr>
+                                        <p:cTn id="7" dur="500"/>
+                                        <p:tgtEl>
+                                          <p:spTgt spid="5">
+                                            <p:txEl>
+                                              <p:pRg st="2" end="2"/>
+                                            </p:txEl>
+                                          </p:spTgt>
+                                        </p:tgtEl>
+                                      </p:cBhvr>
+                                    </p:animEffect>
+                                  </p:childTnLst>
+                                </p:cTn>
+                              </p:par>
+                            </p:childTnLst>
+                          </p:cTn>
+                        </p:par>
+                      </p:childTnLst>
+                    </p:cTn>
+                  </p:par>
+                </p:childTnLst>
+              </p:cTn>
+              <p:prevCondLst>
+                <p:cond evt="onPrev" delay="0">
+                  <p:tgtEl>
+                    <p:sldTgt/>
+                  </p:tgtEl>
+                </p:cond>
+              </p:prevCondLst>
+              <p:nextCondLst>
+                <p:cond evt="onNext" delay="0">
+                  <p:tgtEl>
+                    <p:sldTgt/>
+                  </p:tgtEl>
+                </p:cond>
+              </p:nextCondLst>
+            </p:seq>
+          </p:childTnLst>
+        </p:cTn>
+      </p:par>
+    </p:tnLst>
+  </p:timing>
+</p:sld>
+</file>
+
+<file path=ppt/slides/slide11.xml><?xml version="1.0" encoding="utf-8"?>
 <p:sld xmlns:a="http://schemas.openxmlformats.org/drawingml/2006/main" xmlns:r="http://schemas.openxmlformats.org/officeDocument/2006/relationships" xmlns:p="http://schemas.openxmlformats.org/presentationml/2006/main">
   <p:cSld>
     <p:spTree>
@@ -7579,7 +7862,7 @@
 </p:sld>
 </file>
 
-<file path=ppt/slides/slide11.xml><?xml version="1.0" encoding="utf-8"?>
+<file path=ppt/slides/slide12.xml><?xml version="1.0" encoding="utf-8"?>
 <p:sld xmlns:a="http://schemas.openxmlformats.org/drawingml/2006/main" xmlns:r="http://schemas.openxmlformats.org/officeDocument/2006/relationships" xmlns:p="http://schemas.openxmlformats.org/presentationml/2006/main">
   <p:cSld>
     <p:spTree>
@@ -8293,7 +8576,7 @@
 </p:sld>
 </file>
 
-<file path=ppt/slides/slide12.xml><?xml version="1.0" encoding="utf-8"?>
+<file path=ppt/slides/slide13.xml><?xml version="1.0" encoding="utf-8"?>
 <p:sld xmlns:a="http://schemas.openxmlformats.org/drawingml/2006/main" xmlns:r="http://schemas.openxmlformats.org/officeDocument/2006/relationships" xmlns:p="http://schemas.openxmlformats.org/presentationml/2006/main">
   <p:cSld>
     <p:spTree>
@@ -9077,6 +9360,765 @@
 </file>
 
 <file path=ppt/slides/slide3.xml><?xml version="1.0" encoding="utf-8"?>
+<p:sld xmlns:a="http://schemas.openxmlformats.org/drawingml/2006/main" xmlns:r="http://schemas.openxmlformats.org/officeDocument/2006/relationships" xmlns:p="http://schemas.openxmlformats.org/presentationml/2006/main">
+  <p:cSld>
+    <p:spTree>
+      <p:nvGrpSpPr>
+        <p:cNvPr id="1" name=""/>
+        <p:cNvGrpSpPr/>
+        <p:nvPr/>
+      </p:nvGrpSpPr>
+      <p:grpSpPr>
+        <a:xfrm>
+          <a:off x="0" y="0"/>
+          <a:ext cx="0" cy="0"/>
+          <a:chOff x="0" y="0"/>
+          <a:chExt cx="0" cy="0"/>
+        </a:xfrm>
+      </p:grpSpPr>
+      <p:sp>
+        <p:nvSpPr>
+          <p:cNvPr id="3" name="Espace réservé du contenu 2"/>
+          <p:cNvSpPr>
+            <a:spLocks noGrp="1"/>
+          </p:cNvSpPr>
+          <p:nvPr>
+            <p:ph idx="1"/>
+          </p:nvPr>
+        </p:nvSpPr>
+        <p:spPr>
+          <a:xfrm>
+            <a:off x="397565" y="377687"/>
+            <a:ext cx="11184835" cy="5748477"/>
+          </a:xfrm>
+        </p:spPr>
+        <p:txBody>
+          <a:bodyPr/>
+          <a:lstStyle/>
+          <a:p>
+            <a:pPr marL="0" indent="0">
+              <a:buNone/>
+            </a:pPr>
+            <a:r>
+              <a:rPr lang="en-US" sz="3600" dirty="0">
+                <a:solidFill>
+                  <a:srgbClr val="FFC000"/>
+                </a:solidFill>
+                <a:latin typeface="Courier New" panose="02070309020205020404" pitchFamily="49" charset="0"/>
+                <a:cs typeface="Courier New" panose="02070309020205020404" pitchFamily="49" charset="0"/>
+              </a:rPr>
+              <a:t>class</a:t>
+            </a:r>
+            <a:r>
+              <a:rPr lang="en-US" sz="3600" dirty="0">
+                <a:latin typeface="Courier New" panose="02070309020205020404" pitchFamily="49" charset="0"/>
+                <a:cs typeface="Courier New" panose="02070309020205020404" pitchFamily="49" charset="0"/>
+              </a:rPr>
+              <a:t> </a:t>
+            </a:r>
+            <a:r>
+              <a:rPr lang="en-US" sz="3600" dirty="0">
+                <a:solidFill>
+                  <a:srgbClr val="0070C0"/>
+                </a:solidFill>
+                <a:latin typeface="Courier New" panose="02070309020205020404" pitchFamily="49" charset="0"/>
+                <a:cs typeface="Courier New" panose="02070309020205020404" pitchFamily="49" charset="0"/>
+              </a:rPr>
+              <a:t>C</a:t>
+            </a:r>
+            <a:r>
+              <a:rPr lang="en-US" sz="3600" dirty="0" smtClean="0">
+                <a:latin typeface="Courier New" panose="02070309020205020404" pitchFamily="49" charset="0"/>
+                <a:cs typeface="Courier New" panose="02070309020205020404" pitchFamily="49" charset="0"/>
+              </a:rPr>
+              <a:t>:</a:t>
+            </a:r>
+          </a:p>
+          <a:p>
+            <a:pPr marL="0" indent="0">
+              <a:buNone/>
+            </a:pPr>
+            <a:r>
+              <a:rPr lang="en-US" sz="3600" dirty="0">
+                <a:latin typeface="Courier New" panose="02070309020205020404" pitchFamily="49" charset="0"/>
+                <a:cs typeface="Courier New" panose="02070309020205020404" pitchFamily="49" charset="0"/>
+              </a:rPr>
+              <a:t> </a:t>
+            </a:r>
+            <a:r>
+              <a:rPr lang="en-US" sz="3600" dirty="0" smtClean="0">
+                <a:latin typeface="Courier New" panose="02070309020205020404" pitchFamily="49" charset="0"/>
+                <a:cs typeface="Courier New" panose="02070309020205020404" pitchFamily="49" charset="0"/>
+              </a:rPr>
+              <a:t>   @</a:t>
+            </a:r>
+            <a:r>
+              <a:rPr lang="en-US" sz="3600" dirty="0" err="1">
+                <a:solidFill>
+                  <a:srgbClr val="7030A0"/>
+                </a:solidFill>
+                <a:latin typeface="Courier New" panose="02070309020205020404" pitchFamily="49" charset="0"/>
+                <a:cs typeface="Courier New" panose="02070309020205020404" pitchFamily="49" charset="0"/>
+              </a:rPr>
+              <a:t>classmethod</a:t>
+            </a:r>
+            <a:endParaRPr lang="en-US" sz="3600" dirty="0">
+              <a:latin typeface="Courier New" panose="02070309020205020404" pitchFamily="49" charset="0"/>
+              <a:cs typeface="Courier New" panose="02070309020205020404" pitchFamily="49" charset="0"/>
+            </a:endParaRPr>
+          </a:p>
+          <a:p>
+            <a:pPr marL="0" indent="0">
+              <a:buNone/>
+            </a:pPr>
+            <a:r>
+              <a:rPr lang="en-US" sz="3600" dirty="0">
+                <a:latin typeface="Courier New" panose="02070309020205020404" pitchFamily="49" charset="0"/>
+                <a:cs typeface="Courier New" panose="02070309020205020404" pitchFamily="49" charset="0"/>
+              </a:rPr>
+              <a:t>    </a:t>
+            </a:r>
+            <a:r>
+              <a:rPr lang="en-US" sz="3600" dirty="0" err="1">
+                <a:solidFill>
+                  <a:srgbClr val="FFC000"/>
+                </a:solidFill>
+                <a:latin typeface="Courier New" panose="02070309020205020404" pitchFamily="49" charset="0"/>
+                <a:cs typeface="Courier New" panose="02070309020205020404" pitchFamily="49" charset="0"/>
+              </a:rPr>
+              <a:t>def</a:t>
+            </a:r>
+            <a:r>
+              <a:rPr lang="en-US" sz="3600" dirty="0">
+                <a:solidFill>
+                  <a:srgbClr val="FFC000"/>
+                </a:solidFill>
+                <a:latin typeface="Courier New" panose="02070309020205020404" pitchFamily="49" charset="0"/>
+                <a:cs typeface="Courier New" panose="02070309020205020404" pitchFamily="49" charset="0"/>
+              </a:rPr>
+              <a:t> </a:t>
+            </a:r>
+            <a:r>
+              <a:rPr lang="en-US" sz="3600" dirty="0">
+                <a:solidFill>
+                  <a:srgbClr val="0070C0"/>
+                </a:solidFill>
+                <a:latin typeface="Courier New" panose="02070309020205020404" pitchFamily="49" charset="0"/>
+                <a:cs typeface="Courier New" panose="02070309020205020404" pitchFamily="49" charset="0"/>
+              </a:rPr>
+              <a:t>f</a:t>
+            </a:r>
+            <a:r>
+              <a:rPr lang="en-US" sz="3600" dirty="0">
+                <a:latin typeface="Courier New" panose="02070309020205020404" pitchFamily="49" charset="0"/>
+                <a:cs typeface="Courier New" panose="02070309020205020404" pitchFamily="49" charset="0"/>
+              </a:rPr>
+              <a:t>(c):</a:t>
+            </a:r>
+          </a:p>
+          <a:p>
+            <a:pPr marL="0" indent="0">
+              <a:buNone/>
+            </a:pPr>
+            <a:r>
+              <a:rPr lang="en-US" sz="3600" dirty="0">
+                <a:latin typeface="Courier New" panose="02070309020205020404" pitchFamily="49" charset="0"/>
+                <a:cs typeface="Courier New" panose="02070309020205020404" pitchFamily="49" charset="0"/>
+              </a:rPr>
+              <a:t>        </a:t>
+            </a:r>
+            <a:r>
+              <a:rPr lang="en-US" sz="3600" dirty="0" smtClean="0">
+                <a:solidFill>
+                  <a:srgbClr val="FFC000"/>
+                </a:solidFill>
+                <a:latin typeface="Courier New" panose="02070309020205020404" pitchFamily="49" charset="0"/>
+                <a:cs typeface="Courier New" panose="02070309020205020404" pitchFamily="49" charset="0"/>
+              </a:rPr>
+              <a:t>pass</a:t>
+            </a:r>
+          </a:p>
+          <a:p>
+            <a:pPr marL="0" indent="0">
+              <a:buNone/>
+            </a:pPr>
+            <a:r>
+              <a:rPr lang="en-US" sz="3600" dirty="0">
+                <a:solidFill>
+                  <a:srgbClr val="FFC000"/>
+                </a:solidFill>
+                <a:latin typeface="Courier New" panose="02070309020205020404" pitchFamily="49" charset="0"/>
+                <a:cs typeface="Courier New" panose="02070309020205020404" pitchFamily="49" charset="0"/>
+              </a:rPr>
+              <a:t> </a:t>
+            </a:r>
+            <a:r>
+              <a:rPr lang="en-US" sz="3600" dirty="0" smtClean="0">
+                <a:solidFill>
+                  <a:srgbClr val="FFC000"/>
+                </a:solidFill>
+                <a:latin typeface="Courier New" panose="02070309020205020404" pitchFamily="49" charset="0"/>
+                <a:cs typeface="Courier New" panose="02070309020205020404" pitchFamily="49" charset="0"/>
+              </a:rPr>
+              <a:t>   </a:t>
+            </a:r>
+            <a:r>
+              <a:rPr lang="en-US" sz="3600" dirty="0" smtClean="0">
+                <a:latin typeface="Courier New" panose="02070309020205020404" pitchFamily="49" charset="0"/>
+                <a:cs typeface="Courier New" panose="02070309020205020404" pitchFamily="49" charset="0"/>
+              </a:rPr>
+              <a:t>@</a:t>
+            </a:r>
+            <a:r>
+              <a:rPr lang="en-US" sz="3600" dirty="0" err="1">
+                <a:solidFill>
+                  <a:srgbClr val="7030A0"/>
+                </a:solidFill>
+                <a:latin typeface="Courier New" panose="02070309020205020404" pitchFamily="49" charset="0"/>
+                <a:cs typeface="Courier New" panose="02070309020205020404" pitchFamily="49" charset="0"/>
+              </a:rPr>
+              <a:t>staticmethod</a:t>
+            </a:r>
+            <a:endParaRPr lang="en-US" sz="3600" dirty="0">
+              <a:solidFill>
+                <a:srgbClr val="FFC000"/>
+              </a:solidFill>
+              <a:latin typeface="Courier New" panose="02070309020205020404" pitchFamily="49" charset="0"/>
+              <a:cs typeface="Courier New" panose="02070309020205020404" pitchFamily="49" charset="0"/>
+            </a:endParaRPr>
+          </a:p>
+          <a:p>
+            <a:pPr marL="0" indent="0">
+              <a:buNone/>
+            </a:pPr>
+            <a:r>
+              <a:rPr lang="en-US" sz="3600" dirty="0">
+                <a:latin typeface="Courier New" panose="02070309020205020404" pitchFamily="49" charset="0"/>
+                <a:cs typeface="Courier New" panose="02070309020205020404" pitchFamily="49" charset="0"/>
+              </a:rPr>
+              <a:t>    </a:t>
+            </a:r>
+            <a:r>
+              <a:rPr lang="en-US" sz="3600" dirty="0" err="1">
+                <a:solidFill>
+                  <a:srgbClr val="FFC000"/>
+                </a:solidFill>
+                <a:latin typeface="Courier New" panose="02070309020205020404" pitchFamily="49" charset="0"/>
+                <a:cs typeface="Courier New" panose="02070309020205020404" pitchFamily="49" charset="0"/>
+              </a:rPr>
+              <a:t>def</a:t>
+            </a:r>
+            <a:r>
+              <a:rPr lang="en-US" sz="3600" dirty="0">
+                <a:solidFill>
+                  <a:srgbClr val="FFC000"/>
+                </a:solidFill>
+                <a:latin typeface="Courier New" panose="02070309020205020404" pitchFamily="49" charset="0"/>
+                <a:cs typeface="Courier New" panose="02070309020205020404" pitchFamily="49" charset="0"/>
+              </a:rPr>
+              <a:t> </a:t>
+            </a:r>
+            <a:r>
+              <a:rPr lang="en-US" sz="3600" dirty="0">
+                <a:solidFill>
+                  <a:srgbClr val="0070C0"/>
+                </a:solidFill>
+                <a:latin typeface="Courier New" panose="02070309020205020404" pitchFamily="49" charset="0"/>
+                <a:cs typeface="Courier New" panose="02070309020205020404" pitchFamily="49" charset="0"/>
+              </a:rPr>
+              <a:t>g</a:t>
+            </a:r>
+            <a:r>
+              <a:rPr lang="en-US" sz="3600" dirty="0">
+                <a:latin typeface="Courier New" panose="02070309020205020404" pitchFamily="49" charset="0"/>
+                <a:cs typeface="Courier New" panose="02070309020205020404" pitchFamily="49" charset="0"/>
+              </a:rPr>
+              <a:t>():</a:t>
+            </a:r>
+          </a:p>
+          <a:p>
+            <a:pPr marL="0" indent="0">
+              <a:buNone/>
+            </a:pPr>
+            <a:r>
+              <a:rPr lang="en-US" sz="3600" dirty="0">
+                <a:latin typeface="Courier New" panose="02070309020205020404" pitchFamily="49" charset="0"/>
+                <a:cs typeface="Courier New" panose="02070309020205020404" pitchFamily="49" charset="0"/>
+              </a:rPr>
+              <a:t>        </a:t>
+            </a:r>
+            <a:r>
+              <a:rPr lang="en-US" sz="3600" dirty="0" smtClean="0">
+                <a:solidFill>
+                  <a:srgbClr val="FFC000"/>
+                </a:solidFill>
+                <a:latin typeface="Courier New" panose="02070309020205020404" pitchFamily="49" charset="0"/>
+                <a:cs typeface="Courier New" panose="02070309020205020404" pitchFamily="49" charset="0"/>
+              </a:rPr>
+              <a:t>pass</a:t>
+            </a:r>
+          </a:p>
+          <a:p>
+            <a:pPr marL="0" indent="0">
+              <a:buNone/>
+            </a:pPr>
+            <a:r>
+              <a:rPr lang="en-US" sz="3600" dirty="0">
+                <a:solidFill>
+                  <a:srgbClr val="FFC000"/>
+                </a:solidFill>
+                <a:latin typeface="Courier New" panose="02070309020205020404" pitchFamily="49" charset="0"/>
+                <a:cs typeface="Courier New" panose="02070309020205020404" pitchFamily="49" charset="0"/>
+              </a:rPr>
+              <a:t>	 </a:t>
+            </a:r>
+            <a:r>
+              <a:rPr lang="en-US" sz="3600" dirty="0" smtClean="0">
+                <a:latin typeface="Courier New" panose="02070309020205020404" pitchFamily="49" charset="0"/>
+                <a:cs typeface="Courier New" panose="02070309020205020404" pitchFamily="49" charset="0"/>
+              </a:rPr>
+              <a:t>…</a:t>
+            </a:r>
+            <a:endParaRPr lang="en-US" sz="3600" dirty="0">
+              <a:latin typeface="Courier New" panose="02070309020205020404" pitchFamily="49" charset="0"/>
+              <a:cs typeface="Courier New" panose="02070309020205020404" pitchFamily="49" charset="0"/>
+            </a:endParaRPr>
+          </a:p>
+        </p:txBody>
+      </p:sp>
+    </p:spTree>
+    <p:extLst>
+      <p:ext uri="{BB962C8B-B14F-4D97-AF65-F5344CB8AC3E}">
+        <p14:creationId xmlns:p14="http://schemas.microsoft.com/office/powerpoint/2010/main" val="1640993505"/>
+      </p:ext>
+    </p:extLst>
+  </p:cSld>
+  <p:clrMapOvr>
+    <a:masterClrMapping/>
+  </p:clrMapOvr>
+  <p:timing>
+    <p:tnLst>
+      <p:par>
+        <p:cTn id="1" dur="indefinite" restart="never" nodeType="tmRoot">
+          <p:childTnLst>
+            <p:seq concurrent="1" nextAc="seek">
+              <p:cTn id="2" dur="indefinite" nodeType="mainSeq">
+                <p:childTnLst>
+                  <p:par>
+                    <p:cTn id="3" fill="hold">
+                      <p:stCondLst>
+                        <p:cond delay="indefinite"/>
+                      </p:stCondLst>
+                      <p:childTnLst>
+                        <p:par>
+                          <p:cTn id="4" fill="hold">
+                            <p:stCondLst>
+                              <p:cond delay="0"/>
+                            </p:stCondLst>
+                            <p:childTnLst>
+                              <p:par>
+                                <p:cTn id="5" presetID="1" presetClass="entr" presetSubtype="0" fill="hold" nodeType="clickEffect">
+                                  <p:stCondLst>
+                                    <p:cond delay="0"/>
+                                  </p:stCondLst>
+                                  <p:iterate type="lt">
+                                    <p:tmAbs val="100"/>
+                                  </p:iterate>
+                                  <p:childTnLst>
+                                    <p:set>
+                                      <p:cBhvr>
+                                        <p:cTn id="6" dur="1" fill="hold">
+                                          <p:stCondLst>
+                                            <p:cond delay="0"/>
+                                          </p:stCondLst>
+                                        </p:cTn>
+                                        <p:tgtEl>
+                                          <p:spTgt spid="3">
+                                            <p:txEl>
+                                              <p:pRg st="0" end="0"/>
+                                            </p:txEl>
+                                          </p:spTgt>
+                                        </p:tgtEl>
+                                        <p:attrNameLst>
+                                          <p:attrName>style.visibility</p:attrName>
+                                        </p:attrNameLst>
+                                      </p:cBhvr>
+                                      <p:to>
+                                        <p:strVal val="visible"/>
+                                      </p:to>
+                                    </p:set>
+                                  </p:childTnLst>
+                                </p:cTn>
+                              </p:par>
+                            </p:childTnLst>
+                          </p:cTn>
+                        </p:par>
+                      </p:childTnLst>
+                    </p:cTn>
+                  </p:par>
+                  <p:par>
+                    <p:cTn id="7" fill="hold">
+                      <p:stCondLst>
+                        <p:cond delay="indefinite"/>
+                      </p:stCondLst>
+                      <p:childTnLst>
+                        <p:par>
+                          <p:cTn id="8" fill="hold">
+                            <p:stCondLst>
+                              <p:cond delay="0"/>
+                            </p:stCondLst>
+                            <p:childTnLst>
+                              <p:par>
+                                <p:cTn id="9" presetID="1" presetClass="entr" presetSubtype="0" fill="hold" nodeType="clickEffect">
+                                  <p:stCondLst>
+                                    <p:cond delay="0"/>
+                                  </p:stCondLst>
+                                  <p:iterate type="lt">
+                                    <p:tmAbs val="100"/>
+                                  </p:iterate>
+                                  <p:childTnLst>
+                                    <p:set>
+                                      <p:cBhvr>
+                                        <p:cTn id="10" dur="1" fill="hold">
+                                          <p:stCondLst>
+                                            <p:cond delay="0"/>
+                                          </p:stCondLst>
+                                        </p:cTn>
+                                        <p:tgtEl>
+                                          <p:spTgt spid="3">
+                                            <p:txEl>
+                                              <p:pRg st="2" end="2"/>
+                                            </p:txEl>
+                                          </p:spTgt>
+                                        </p:tgtEl>
+                                        <p:attrNameLst>
+                                          <p:attrName>style.visibility</p:attrName>
+                                        </p:attrNameLst>
+                                      </p:cBhvr>
+                                      <p:to>
+                                        <p:strVal val="visible"/>
+                                      </p:to>
+                                    </p:set>
+                                  </p:childTnLst>
+                                </p:cTn>
+                              </p:par>
+                            </p:childTnLst>
+                          </p:cTn>
+                        </p:par>
+                        <p:par>
+                          <p:cTn id="11" fill="hold">
+                            <p:stCondLst>
+                              <p:cond delay="701"/>
+                            </p:stCondLst>
+                            <p:childTnLst>
+                              <p:par>
+                                <p:cTn id="12" presetID="1" presetClass="entr" presetSubtype="0" fill="hold" nodeType="afterEffect">
+                                  <p:stCondLst>
+                                    <p:cond delay="0"/>
+                                  </p:stCondLst>
+                                  <p:iterate type="lt">
+                                    <p:tmAbs val="100"/>
+                                  </p:iterate>
+                                  <p:childTnLst>
+                                    <p:set>
+                                      <p:cBhvr>
+                                        <p:cTn id="13" dur="1" fill="hold">
+                                          <p:stCondLst>
+                                            <p:cond delay="0"/>
+                                          </p:stCondLst>
+                                        </p:cTn>
+                                        <p:tgtEl>
+                                          <p:spTgt spid="3">
+                                            <p:txEl>
+                                              <p:pRg st="3" end="3"/>
+                                            </p:txEl>
+                                          </p:spTgt>
+                                        </p:tgtEl>
+                                        <p:attrNameLst>
+                                          <p:attrName>style.visibility</p:attrName>
+                                        </p:attrNameLst>
+                                      </p:cBhvr>
+                                      <p:to>
+                                        <p:strVal val="visible"/>
+                                      </p:to>
+                                    </p:set>
+                                  </p:childTnLst>
+                                </p:cTn>
+                              </p:par>
+                            </p:childTnLst>
+                          </p:cTn>
+                        </p:par>
+                      </p:childTnLst>
+                    </p:cTn>
+                  </p:par>
+                  <p:par>
+                    <p:cTn id="14" fill="hold">
+                      <p:stCondLst>
+                        <p:cond delay="indefinite"/>
+                      </p:stCondLst>
+                      <p:childTnLst>
+                        <p:par>
+                          <p:cTn id="15" fill="hold">
+                            <p:stCondLst>
+                              <p:cond delay="0"/>
+                            </p:stCondLst>
+                            <p:childTnLst>
+                              <p:par>
+                                <p:cTn id="16" presetID="1" presetClass="entr" presetSubtype="0" fill="hold" nodeType="clickEffect">
+                                  <p:stCondLst>
+                                    <p:cond delay="0"/>
+                                  </p:stCondLst>
+                                  <p:iterate type="lt">
+                                    <p:tmAbs val="100"/>
+                                  </p:iterate>
+                                  <p:childTnLst>
+                                    <p:set>
+                                      <p:cBhvr>
+                                        <p:cTn id="17" dur="1" fill="hold">
+                                          <p:stCondLst>
+                                            <p:cond delay="0"/>
+                                          </p:stCondLst>
+                                        </p:cTn>
+                                        <p:tgtEl>
+                                          <p:spTgt spid="3">
+                                            <p:txEl>
+                                              <p:pRg st="1" end="1"/>
+                                            </p:txEl>
+                                          </p:spTgt>
+                                        </p:tgtEl>
+                                        <p:attrNameLst>
+                                          <p:attrName>style.visibility</p:attrName>
+                                        </p:attrNameLst>
+                                      </p:cBhvr>
+                                      <p:to>
+                                        <p:strVal val="visible"/>
+                                      </p:to>
+                                    </p:set>
+                                  </p:childTnLst>
+                                </p:cTn>
+                              </p:par>
+                            </p:childTnLst>
+                          </p:cTn>
+                        </p:par>
+                      </p:childTnLst>
+                    </p:cTn>
+                  </p:par>
+                  <p:par>
+                    <p:cTn id="18" fill="hold">
+                      <p:stCondLst>
+                        <p:cond delay="indefinite"/>
+                      </p:stCondLst>
+                      <p:childTnLst>
+                        <p:par>
+                          <p:cTn id="19" fill="hold">
+                            <p:stCondLst>
+                              <p:cond delay="0"/>
+                            </p:stCondLst>
+                            <p:childTnLst>
+                              <p:par>
+                                <p:cTn id="20" presetID="1" presetClass="entr" presetSubtype="0" fill="hold" nodeType="clickEffect">
+                                  <p:stCondLst>
+                                    <p:cond delay="0"/>
+                                  </p:stCondLst>
+                                  <p:iterate type="lt">
+                                    <p:tmAbs val="100"/>
+                                  </p:iterate>
+                                  <p:childTnLst>
+                                    <p:set>
+                                      <p:cBhvr>
+                                        <p:cTn id="21" dur="1" fill="hold">
+                                          <p:stCondLst>
+                                            <p:cond delay="0"/>
+                                          </p:stCondLst>
+                                        </p:cTn>
+                                        <p:tgtEl>
+                                          <p:spTgt spid="3">
+                                            <p:txEl>
+                                              <p:pRg st="5" end="5"/>
+                                            </p:txEl>
+                                          </p:spTgt>
+                                        </p:tgtEl>
+                                        <p:attrNameLst>
+                                          <p:attrName>style.visibility</p:attrName>
+                                        </p:attrNameLst>
+                                      </p:cBhvr>
+                                      <p:to>
+                                        <p:strVal val="visible"/>
+                                      </p:to>
+                                    </p:set>
+                                  </p:childTnLst>
+                                </p:cTn>
+                              </p:par>
+                            </p:childTnLst>
+                          </p:cTn>
+                        </p:par>
+                        <p:par>
+                          <p:cTn id="22" fill="hold">
+                            <p:stCondLst>
+                              <p:cond delay="601"/>
+                            </p:stCondLst>
+                            <p:childTnLst>
+                              <p:par>
+                                <p:cTn id="23" presetID="1" presetClass="entr" presetSubtype="0" fill="hold" nodeType="afterEffect">
+                                  <p:stCondLst>
+                                    <p:cond delay="0"/>
+                                  </p:stCondLst>
+                                  <p:iterate type="lt">
+                                    <p:tmAbs val="100"/>
+                                  </p:iterate>
+                                  <p:childTnLst>
+                                    <p:set>
+                                      <p:cBhvr>
+                                        <p:cTn id="24" dur="1" fill="hold">
+                                          <p:stCondLst>
+                                            <p:cond delay="0"/>
+                                          </p:stCondLst>
+                                        </p:cTn>
+                                        <p:tgtEl>
+                                          <p:spTgt spid="3">
+                                            <p:txEl>
+                                              <p:pRg st="6" end="6"/>
+                                            </p:txEl>
+                                          </p:spTgt>
+                                        </p:tgtEl>
+                                        <p:attrNameLst>
+                                          <p:attrName>style.visibility</p:attrName>
+                                        </p:attrNameLst>
+                                      </p:cBhvr>
+                                      <p:to>
+                                        <p:strVal val="visible"/>
+                                      </p:to>
+                                    </p:set>
+                                  </p:childTnLst>
+                                </p:cTn>
+                              </p:par>
+                            </p:childTnLst>
+                          </p:cTn>
+                        </p:par>
+                      </p:childTnLst>
+                    </p:cTn>
+                  </p:par>
+                  <p:par>
+                    <p:cTn id="25" fill="hold">
+                      <p:stCondLst>
+                        <p:cond delay="indefinite"/>
+                      </p:stCondLst>
+                      <p:childTnLst>
+                        <p:par>
+                          <p:cTn id="26" fill="hold">
+                            <p:stCondLst>
+                              <p:cond delay="0"/>
+                            </p:stCondLst>
+                            <p:childTnLst>
+                              <p:par>
+                                <p:cTn id="27" presetID="1" presetClass="entr" presetSubtype="0" fill="hold" nodeType="clickEffect">
+                                  <p:stCondLst>
+                                    <p:cond delay="0"/>
+                                  </p:stCondLst>
+                                  <p:iterate type="lt">
+                                    <p:tmAbs val="100"/>
+                                  </p:iterate>
+                                  <p:childTnLst>
+                                    <p:set>
+                                      <p:cBhvr>
+                                        <p:cTn id="28" dur="1" fill="hold">
+                                          <p:stCondLst>
+                                            <p:cond delay="0"/>
+                                          </p:stCondLst>
+                                        </p:cTn>
+                                        <p:tgtEl>
+                                          <p:spTgt spid="3">
+                                            <p:txEl>
+                                              <p:pRg st="4" end="4"/>
+                                            </p:txEl>
+                                          </p:spTgt>
+                                        </p:tgtEl>
+                                        <p:attrNameLst>
+                                          <p:attrName>style.visibility</p:attrName>
+                                        </p:attrNameLst>
+                                      </p:cBhvr>
+                                      <p:to>
+                                        <p:strVal val="visible"/>
+                                      </p:to>
+                                    </p:set>
+                                  </p:childTnLst>
+                                </p:cTn>
+                              </p:par>
+                            </p:childTnLst>
+                          </p:cTn>
+                        </p:par>
+                        <p:par>
+                          <p:cTn id="29" fill="hold">
+                            <p:stCondLst>
+                              <p:cond delay="1201"/>
+                            </p:stCondLst>
+                            <p:childTnLst>
+                              <p:par>
+                                <p:cTn id="30" presetID="1" presetClass="entr" presetSubtype="0" fill="hold" nodeType="afterEffect">
+                                  <p:stCondLst>
+                                    <p:cond delay="0"/>
+                                  </p:stCondLst>
+                                  <p:iterate type="lt">
+                                    <p:tmAbs val="100"/>
+                                  </p:iterate>
+                                  <p:childTnLst>
+                                    <p:set>
+                                      <p:cBhvr>
+                                        <p:cTn id="31" dur="1" fill="hold">
+                                          <p:stCondLst>
+                                            <p:cond delay="0"/>
+                                          </p:stCondLst>
+                                        </p:cTn>
+                                        <p:tgtEl>
+                                          <p:spTgt spid="3">
+                                            <p:txEl>
+                                              <p:pRg st="7" end="7"/>
+                                            </p:txEl>
+                                          </p:spTgt>
+                                        </p:tgtEl>
+                                        <p:attrNameLst>
+                                          <p:attrName>style.visibility</p:attrName>
+                                        </p:attrNameLst>
+                                      </p:cBhvr>
+                                      <p:to>
+                                        <p:strVal val="visible"/>
+                                      </p:to>
+                                    </p:set>
+                                  </p:childTnLst>
+                                </p:cTn>
+                              </p:par>
+                            </p:childTnLst>
+                          </p:cTn>
+                        </p:par>
+                      </p:childTnLst>
+                    </p:cTn>
+                  </p:par>
+                </p:childTnLst>
+              </p:cTn>
+              <p:prevCondLst>
+                <p:cond evt="onPrev" delay="0">
+                  <p:tgtEl>
+                    <p:sldTgt/>
+                  </p:tgtEl>
+                </p:cond>
+              </p:prevCondLst>
+              <p:nextCondLst>
+                <p:cond evt="onNext" delay="0">
+                  <p:tgtEl>
+                    <p:sldTgt/>
+                  </p:tgtEl>
+                </p:cond>
+              </p:nextCondLst>
+            </p:seq>
+          </p:childTnLst>
+        </p:cTn>
+      </p:par>
+    </p:tnLst>
+  </p:timing>
+</p:sld>
+</file>
+
+<file path=ppt/slides/slide4.xml><?xml version="1.0" encoding="utf-8"?>
 <p:sld xmlns:a="http://schemas.openxmlformats.org/drawingml/2006/main" xmlns:r="http://schemas.openxmlformats.org/officeDocument/2006/relationships" xmlns:p="http://schemas.openxmlformats.org/presentationml/2006/main">
   <p:cSld>
     <p:spTree>
@@ -9825,7 +10867,7 @@
 </p:sld>
 </file>
 
-<file path=ppt/slides/slide4.xml><?xml version="1.0" encoding="utf-8"?>
+<file path=ppt/slides/slide5.xml><?xml version="1.0" encoding="utf-8"?>
 <p:sld xmlns:a="http://schemas.openxmlformats.org/drawingml/2006/main" xmlns:r="http://schemas.openxmlformats.org/officeDocument/2006/relationships" xmlns:p="http://schemas.openxmlformats.org/presentationml/2006/main">
   <p:cSld>
     <p:spTree>
@@ -10155,7 +11197,7 @@
     </p:spTree>
     <p:extLst>
       <p:ext uri="{BB962C8B-B14F-4D97-AF65-F5344CB8AC3E}">
-        <p14:creationId xmlns:p14="http://schemas.microsoft.com/office/powerpoint/2010/main" val="1640993505"/>
+        <p14:creationId xmlns:p14="http://schemas.microsoft.com/office/powerpoint/2010/main" val="825493653"/>
       </p:ext>
     </p:extLst>
   </p:cSld>
@@ -10165,426 +11207,14 @@
   <p:timing>
     <p:tnLst>
       <p:par>
-        <p:cTn id="1" dur="indefinite" restart="never" nodeType="tmRoot">
-          <p:childTnLst>
-            <p:seq concurrent="1" nextAc="seek">
-              <p:cTn id="2" dur="indefinite" nodeType="mainSeq">
-                <p:childTnLst>
-                  <p:par>
-                    <p:cTn id="3" fill="hold">
-                      <p:stCondLst>
-                        <p:cond delay="indefinite"/>
-                      </p:stCondLst>
-                      <p:childTnLst>
-                        <p:par>
-                          <p:cTn id="4" fill="hold">
-                            <p:stCondLst>
-                              <p:cond delay="0"/>
-                            </p:stCondLst>
-                            <p:childTnLst>
-                              <p:par>
-                                <p:cTn id="5" presetID="1" presetClass="entr" presetSubtype="0" fill="hold" nodeType="clickEffect">
-                                  <p:stCondLst>
-                                    <p:cond delay="0"/>
-                                  </p:stCondLst>
-                                  <p:iterate type="lt">
-                                    <p:tmAbs val="100"/>
-                                  </p:iterate>
-                                  <p:childTnLst>
-                                    <p:set>
-                                      <p:cBhvr>
-                                        <p:cTn id="6" dur="1" fill="hold">
-                                          <p:stCondLst>
-                                            <p:cond delay="0"/>
-                                          </p:stCondLst>
-                                        </p:cTn>
-                                        <p:tgtEl>
-                                          <p:spTgt spid="3">
-                                            <p:txEl>
-                                              <p:pRg st="0" end="0"/>
-                                            </p:txEl>
-                                          </p:spTgt>
-                                        </p:tgtEl>
-                                        <p:attrNameLst>
-                                          <p:attrName>style.visibility</p:attrName>
-                                        </p:attrNameLst>
-                                      </p:cBhvr>
-                                      <p:to>
-                                        <p:strVal val="visible"/>
-                                      </p:to>
-                                    </p:set>
-                                  </p:childTnLst>
-                                </p:cTn>
-                              </p:par>
-                            </p:childTnLst>
-                          </p:cTn>
-                        </p:par>
-                      </p:childTnLst>
-                    </p:cTn>
-                  </p:par>
-                  <p:par>
-                    <p:cTn id="7" fill="hold">
-                      <p:stCondLst>
-                        <p:cond delay="indefinite"/>
-                      </p:stCondLst>
-                      <p:childTnLst>
-                        <p:par>
-                          <p:cTn id="8" fill="hold">
-                            <p:stCondLst>
-                              <p:cond delay="0"/>
-                            </p:stCondLst>
-                            <p:childTnLst>
-                              <p:par>
-                                <p:cTn id="9" presetID="1" presetClass="entr" presetSubtype="0" fill="hold" nodeType="clickEffect">
-                                  <p:stCondLst>
-                                    <p:cond delay="0"/>
-                                  </p:stCondLst>
-                                  <p:iterate type="lt">
-                                    <p:tmAbs val="100"/>
-                                  </p:iterate>
-                                  <p:childTnLst>
-                                    <p:set>
-                                      <p:cBhvr>
-                                        <p:cTn id="10" dur="1" fill="hold">
-                                          <p:stCondLst>
-                                            <p:cond delay="0"/>
-                                          </p:stCondLst>
-                                        </p:cTn>
-                                        <p:tgtEl>
-                                          <p:spTgt spid="3">
-                                            <p:txEl>
-                                              <p:pRg st="2" end="2"/>
-                                            </p:txEl>
-                                          </p:spTgt>
-                                        </p:tgtEl>
-                                        <p:attrNameLst>
-                                          <p:attrName>style.visibility</p:attrName>
-                                        </p:attrNameLst>
-                                      </p:cBhvr>
-                                      <p:to>
-                                        <p:strVal val="visible"/>
-                                      </p:to>
-                                    </p:set>
-                                  </p:childTnLst>
-                                </p:cTn>
-                              </p:par>
-                            </p:childTnLst>
-                          </p:cTn>
-                        </p:par>
-                        <p:par>
-                          <p:cTn id="11" fill="hold">
-                            <p:stCondLst>
-                              <p:cond delay="701"/>
-                            </p:stCondLst>
-                            <p:childTnLst>
-                              <p:par>
-                                <p:cTn id="12" presetID="1" presetClass="entr" presetSubtype="0" fill="hold" nodeType="afterEffect">
-                                  <p:stCondLst>
-                                    <p:cond delay="0"/>
-                                  </p:stCondLst>
-                                  <p:iterate type="lt">
-                                    <p:tmAbs val="100"/>
-                                  </p:iterate>
-                                  <p:childTnLst>
-                                    <p:set>
-                                      <p:cBhvr>
-                                        <p:cTn id="13" dur="1" fill="hold">
-                                          <p:stCondLst>
-                                            <p:cond delay="0"/>
-                                          </p:stCondLst>
-                                        </p:cTn>
-                                        <p:tgtEl>
-                                          <p:spTgt spid="3">
-                                            <p:txEl>
-                                              <p:pRg st="3" end="3"/>
-                                            </p:txEl>
-                                          </p:spTgt>
-                                        </p:tgtEl>
-                                        <p:attrNameLst>
-                                          <p:attrName>style.visibility</p:attrName>
-                                        </p:attrNameLst>
-                                      </p:cBhvr>
-                                      <p:to>
-                                        <p:strVal val="visible"/>
-                                      </p:to>
-                                    </p:set>
-                                  </p:childTnLst>
-                                </p:cTn>
-                              </p:par>
-                            </p:childTnLst>
-                          </p:cTn>
-                        </p:par>
-                      </p:childTnLst>
-                    </p:cTn>
-                  </p:par>
-                  <p:par>
-                    <p:cTn id="14" fill="hold">
-                      <p:stCondLst>
-                        <p:cond delay="indefinite"/>
-                      </p:stCondLst>
-                      <p:childTnLst>
-                        <p:par>
-                          <p:cTn id="15" fill="hold">
-                            <p:stCondLst>
-                              <p:cond delay="0"/>
-                            </p:stCondLst>
-                            <p:childTnLst>
-                              <p:par>
-                                <p:cTn id="16" presetID="1" presetClass="entr" presetSubtype="0" fill="hold" nodeType="clickEffect">
-                                  <p:stCondLst>
-                                    <p:cond delay="0"/>
-                                  </p:stCondLst>
-                                  <p:iterate type="lt">
-                                    <p:tmAbs val="100"/>
-                                  </p:iterate>
-                                  <p:childTnLst>
-                                    <p:set>
-                                      <p:cBhvr>
-                                        <p:cTn id="17" dur="1" fill="hold">
-                                          <p:stCondLst>
-                                            <p:cond delay="0"/>
-                                          </p:stCondLst>
-                                        </p:cTn>
-                                        <p:tgtEl>
-                                          <p:spTgt spid="3">
-                                            <p:txEl>
-                                              <p:pRg st="1" end="1"/>
-                                            </p:txEl>
-                                          </p:spTgt>
-                                        </p:tgtEl>
-                                        <p:attrNameLst>
-                                          <p:attrName>style.visibility</p:attrName>
-                                        </p:attrNameLst>
-                                      </p:cBhvr>
-                                      <p:to>
-                                        <p:strVal val="visible"/>
-                                      </p:to>
-                                    </p:set>
-                                  </p:childTnLst>
-                                </p:cTn>
-                              </p:par>
-                            </p:childTnLst>
-                          </p:cTn>
-                        </p:par>
-                      </p:childTnLst>
-                    </p:cTn>
-                  </p:par>
-                  <p:par>
-                    <p:cTn id="18" fill="hold">
-                      <p:stCondLst>
-                        <p:cond delay="indefinite"/>
-                      </p:stCondLst>
-                      <p:childTnLst>
-                        <p:par>
-                          <p:cTn id="19" fill="hold">
-                            <p:stCondLst>
-                              <p:cond delay="0"/>
-                            </p:stCondLst>
-                            <p:childTnLst>
-                              <p:par>
-                                <p:cTn id="20" presetID="1" presetClass="entr" presetSubtype="0" fill="hold" nodeType="clickEffect">
-                                  <p:stCondLst>
-                                    <p:cond delay="0"/>
-                                  </p:stCondLst>
-                                  <p:iterate type="lt">
-                                    <p:tmAbs val="100"/>
-                                  </p:iterate>
-                                  <p:childTnLst>
-                                    <p:set>
-                                      <p:cBhvr>
-                                        <p:cTn id="21" dur="1" fill="hold">
-                                          <p:stCondLst>
-                                            <p:cond delay="0"/>
-                                          </p:stCondLst>
-                                        </p:cTn>
-                                        <p:tgtEl>
-                                          <p:spTgt spid="3">
-                                            <p:txEl>
-                                              <p:pRg st="5" end="5"/>
-                                            </p:txEl>
-                                          </p:spTgt>
-                                        </p:tgtEl>
-                                        <p:attrNameLst>
-                                          <p:attrName>style.visibility</p:attrName>
-                                        </p:attrNameLst>
-                                      </p:cBhvr>
-                                      <p:to>
-                                        <p:strVal val="visible"/>
-                                      </p:to>
-                                    </p:set>
-                                  </p:childTnLst>
-                                </p:cTn>
-                              </p:par>
-                            </p:childTnLst>
-                          </p:cTn>
-                        </p:par>
-                        <p:par>
-                          <p:cTn id="22" fill="hold">
-                            <p:stCondLst>
-                              <p:cond delay="601"/>
-                            </p:stCondLst>
-                            <p:childTnLst>
-                              <p:par>
-                                <p:cTn id="23" presetID="1" presetClass="entr" presetSubtype="0" fill="hold" nodeType="afterEffect">
-                                  <p:stCondLst>
-                                    <p:cond delay="0"/>
-                                  </p:stCondLst>
-                                  <p:iterate type="lt">
-                                    <p:tmAbs val="100"/>
-                                  </p:iterate>
-                                  <p:childTnLst>
-                                    <p:set>
-                                      <p:cBhvr>
-                                        <p:cTn id="24" dur="1" fill="hold">
-                                          <p:stCondLst>
-                                            <p:cond delay="0"/>
-                                          </p:stCondLst>
-                                        </p:cTn>
-                                        <p:tgtEl>
-                                          <p:spTgt spid="3">
-                                            <p:txEl>
-                                              <p:pRg st="6" end="6"/>
-                                            </p:txEl>
-                                          </p:spTgt>
-                                        </p:tgtEl>
-                                        <p:attrNameLst>
-                                          <p:attrName>style.visibility</p:attrName>
-                                        </p:attrNameLst>
-                                      </p:cBhvr>
-                                      <p:to>
-                                        <p:strVal val="visible"/>
-                                      </p:to>
-                                    </p:set>
-                                  </p:childTnLst>
-                                </p:cTn>
-                              </p:par>
-                            </p:childTnLst>
-                          </p:cTn>
-                        </p:par>
-                      </p:childTnLst>
-                    </p:cTn>
-                  </p:par>
-                  <p:par>
-                    <p:cTn id="25" fill="hold">
-                      <p:stCondLst>
-                        <p:cond delay="indefinite"/>
-                      </p:stCondLst>
-                      <p:childTnLst>
-                        <p:par>
-                          <p:cTn id="26" fill="hold">
-                            <p:stCondLst>
-                              <p:cond delay="0"/>
-                            </p:stCondLst>
-                            <p:childTnLst>
-                              <p:par>
-                                <p:cTn id="27" presetID="1" presetClass="entr" presetSubtype="0" fill="hold" nodeType="clickEffect">
-                                  <p:stCondLst>
-                                    <p:cond delay="0"/>
-                                  </p:stCondLst>
-                                  <p:iterate type="lt">
-                                    <p:tmAbs val="100"/>
-                                  </p:iterate>
-                                  <p:childTnLst>
-                                    <p:set>
-                                      <p:cBhvr>
-                                        <p:cTn id="28" dur="1" fill="hold">
-                                          <p:stCondLst>
-                                            <p:cond delay="0"/>
-                                          </p:stCondLst>
-                                        </p:cTn>
-                                        <p:tgtEl>
-                                          <p:spTgt spid="3">
-                                            <p:txEl>
-                                              <p:pRg st="4" end="4"/>
-                                            </p:txEl>
-                                          </p:spTgt>
-                                        </p:tgtEl>
-                                        <p:attrNameLst>
-                                          <p:attrName>style.visibility</p:attrName>
-                                        </p:attrNameLst>
-                                      </p:cBhvr>
-                                      <p:to>
-                                        <p:strVal val="visible"/>
-                                      </p:to>
-                                    </p:set>
-                                  </p:childTnLst>
-                                </p:cTn>
-                              </p:par>
-                            </p:childTnLst>
-                          </p:cTn>
-                        </p:par>
-                        <p:par>
-                          <p:cTn id="29" fill="hold">
-                            <p:stCondLst>
-                              <p:cond delay="1201"/>
-                            </p:stCondLst>
-                            <p:childTnLst>
-                              <p:par>
-                                <p:cTn id="30" presetID="1" presetClass="entr" presetSubtype="0" fill="hold" nodeType="afterEffect">
-                                  <p:stCondLst>
-                                    <p:cond delay="0"/>
-                                  </p:stCondLst>
-                                  <p:iterate type="lt">
-                                    <p:tmAbs val="100"/>
-                                  </p:iterate>
-                                  <p:childTnLst>
-                                    <p:set>
-                                      <p:cBhvr>
-                                        <p:cTn id="31" dur="1" fill="hold">
-                                          <p:stCondLst>
-                                            <p:cond delay="0"/>
-                                          </p:stCondLst>
-                                        </p:cTn>
-                                        <p:tgtEl>
-                                          <p:spTgt spid="3">
-                                            <p:txEl>
-                                              <p:pRg st="7" end="7"/>
-                                            </p:txEl>
-                                          </p:spTgt>
-                                        </p:tgtEl>
-                                        <p:attrNameLst>
-                                          <p:attrName>style.visibility</p:attrName>
-                                        </p:attrNameLst>
-                                      </p:cBhvr>
-                                      <p:to>
-                                        <p:strVal val="visible"/>
-                                      </p:to>
-                                    </p:set>
-                                  </p:childTnLst>
-                                </p:cTn>
-                              </p:par>
-                            </p:childTnLst>
-                          </p:cTn>
-                        </p:par>
-                      </p:childTnLst>
-                    </p:cTn>
-                  </p:par>
-                </p:childTnLst>
-              </p:cTn>
-              <p:prevCondLst>
-                <p:cond evt="onPrev" delay="0">
-                  <p:tgtEl>
-                    <p:sldTgt/>
-                  </p:tgtEl>
-                </p:cond>
-              </p:prevCondLst>
-              <p:nextCondLst>
-                <p:cond evt="onNext" delay="0">
-                  <p:tgtEl>
-                    <p:sldTgt/>
-                  </p:tgtEl>
-                </p:cond>
-              </p:nextCondLst>
-            </p:seq>
-          </p:childTnLst>
-        </p:cTn>
+        <p:cTn id="1" dur="indefinite" restart="never" nodeType="tmRoot"/>
       </p:par>
     </p:tnLst>
   </p:timing>
 </p:sld>
 </file>
 
-<file path=ppt/slides/slide5.xml><?xml version="1.0" encoding="utf-8"?>
+<file path=ppt/slides/slide6.xml><?xml version="1.0" encoding="utf-8"?>
 <p:sld xmlns:a="http://schemas.openxmlformats.org/drawingml/2006/main" xmlns:r="http://schemas.openxmlformats.org/officeDocument/2006/relationships" xmlns:p="http://schemas.openxmlformats.org/presentationml/2006/main">
   <p:cSld>
     <p:spTree>
@@ -11183,7 +11813,7 @@
 </p:sld>
 </file>
 
-<file path=ppt/slides/slide6.xml><?xml version="1.0" encoding="utf-8"?>
+<file path=ppt/slides/slide7.xml><?xml version="1.0" encoding="utf-8"?>
 <p:sld xmlns:a="http://schemas.openxmlformats.org/drawingml/2006/main" xmlns:r="http://schemas.openxmlformats.org/officeDocument/2006/relationships" xmlns:p="http://schemas.openxmlformats.org/presentationml/2006/main">
   <p:cSld>
     <p:spTree>
@@ -11619,7 +12249,7 @@
 </p:sld>
 </file>
 
-<file path=ppt/slides/slide7.xml><?xml version="1.0" encoding="utf-8"?>
+<file path=ppt/slides/slide8.xml><?xml version="1.0" encoding="utf-8"?>
 <p:sld xmlns:a="http://schemas.openxmlformats.org/drawingml/2006/main" xmlns:r="http://schemas.openxmlformats.org/officeDocument/2006/relationships" xmlns:p="http://schemas.openxmlformats.org/presentationml/2006/main">
   <p:cSld>
     <p:spTree>
@@ -12063,7 +12693,7 @@
 </p:sld>
 </file>
 
-<file path=ppt/slides/slide8.xml><?xml version="1.0" encoding="utf-8"?>
+<file path=ppt/slides/slide9.xml><?xml version="1.0" encoding="utf-8"?>
 <p:sld xmlns:a="http://schemas.openxmlformats.org/drawingml/2006/main" xmlns:r="http://schemas.openxmlformats.org/officeDocument/2006/relationships" xmlns:p="http://schemas.openxmlformats.org/presentationml/2006/main">
   <p:cSld>
     <p:spTree>
@@ -12351,189 +12981,6 @@
                                         <p:cTn id="12" dur="500"/>
                                         <p:tgtEl>
                                           <p:spTgt spid="3">
-                                            <p:txEl>
-                                              <p:pRg st="2" end="2"/>
-                                            </p:txEl>
-                                          </p:spTgt>
-                                        </p:tgtEl>
-                                      </p:cBhvr>
-                                    </p:animEffect>
-                                  </p:childTnLst>
-                                </p:cTn>
-                              </p:par>
-                            </p:childTnLst>
-                          </p:cTn>
-                        </p:par>
-                      </p:childTnLst>
-                    </p:cTn>
-                  </p:par>
-                </p:childTnLst>
-              </p:cTn>
-              <p:prevCondLst>
-                <p:cond evt="onPrev" delay="0">
-                  <p:tgtEl>
-                    <p:sldTgt/>
-                  </p:tgtEl>
-                </p:cond>
-              </p:prevCondLst>
-              <p:nextCondLst>
-                <p:cond evt="onNext" delay="0">
-                  <p:tgtEl>
-                    <p:sldTgt/>
-                  </p:tgtEl>
-                </p:cond>
-              </p:nextCondLst>
-            </p:seq>
-          </p:childTnLst>
-        </p:cTn>
-      </p:par>
-    </p:tnLst>
-  </p:timing>
-</p:sld>
-</file>
-
-<file path=ppt/slides/slide9.xml><?xml version="1.0" encoding="utf-8"?>
-<p:sld xmlns:a="http://schemas.openxmlformats.org/drawingml/2006/main" xmlns:r="http://schemas.openxmlformats.org/officeDocument/2006/relationships" xmlns:p="http://schemas.openxmlformats.org/presentationml/2006/main">
-  <p:cSld>
-    <p:spTree>
-      <p:nvGrpSpPr>
-        <p:cNvPr id="1" name=""/>
-        <p:cNvGrpSpPr/>
-        <p:nvPr/>
-      </p:nvGrpSpPr>
-      <p:grpSpPr>
-        <a:xfrm>
-          <a:off x="0" y="0"/>
-          <a:ext cx="0" cy="0"/>
-          <a:chOff x="0" y="0"/>
-          <a:chExt cx="0" cy="0"/>
-        </a:xfrm>
-      </p:grpSpPr>
-      <p:sp>
-        <p:nvSpPr>
-          <p:cNvPr id="5" name="ZoneTexte 4"/>
-          <p:cNvSpPr txBox="1"/>
-          <p:nvPr/>
-        </p:nvSpPr>
-        <p:spPr>
-          <a:xfrm>
-            <a:off x="401444" y="428892"/>
-            <a:ext cx="11106614" cy="4093428"/>
-          </a:xfrm>
-          <a:prstGeom prst="rect">
-            <a:avLst/>
-          </a:prstGeom>
-          <a:noFill/>
-        </p:spPr>
-        <p:txBody>
-          <a:bodyPr wrap="square" rtlCol="0">
-            <a:spAutoFit/>
-          </a:bodyPr>
-          <a:lstStyle/>
-          <a:p>
-            <a:r>
-              <a:rPr lang="fr-FR" sz="6000" dirty="0" smtClean="0">
-                <a:latin typeface="Calibri" panose="020F0502020204030204" pitchFamily="34" charset="0"/>
-              </a:rPr>
-              <a:t>À quoi sert un décorateur ?</a:t>
-            </a:r>
-          </a:p>
-          <a:p>
-            <a:endParaRPr lang="fr-FR" sz="2000" i="1" dirty="0">
-              <a:latin typeface="Calibri" panose="020F0502020204030204" pitchFamily="34" charset="0"/>
-            </a:endParaRPr>
-          </a:p>
-          <a:p>
-            <a:r>
-              <a:rPr lang="fr-FR" sz="6000" dirty="0" smtClean="0">
-                <a:latin typeface="Calibri" panose="020F0502020204030204" pitchFamily="34" charset="0"/>
-              </a:rPr>
-              <a:t>À ajouter une couche de logique à une fonction avec une syntaxe explicite </a:t>
-            </a:r>
-            <a:r>
-              <a:rPr lang="fr-FR" sz="6000" dirty="0" smtClean="0">
-                <a:latin typeface="Courier New" panose="02070309020205020404" pitchFamily="49" charset="0"/>
-                <a:cs typeface="Courier New" panose="02070309020205020404" pitchFamily="49" charset="0"/>
-              </a:rPr>
-              <a:t>@</a:t>
-            </a:r>
-            <a:r>
-              <a:rPr lang="fr-FR" sz="6000" dirty="0" err="1" smtClean="0">
-                <a:latin typeface="Courier New" panose="02070309020205020404" pitchFamily="49" charset="0"/>
-                <a:cs typeface="Courier New" panose="02070309020205020404" pitchFamily="49" charset="0"/>
-              </a:rPr>
-              <a:t>decorateur</a:t>
-            </a:r>
-            <a:endParaRPr lang="fr-FR" sz="6000" dirty="0">
-              <a:latin typeface="Courier New" panose="02070309020205020404" pitchFamily="49" charset="0"/>
-              <a:cs typeface="Courier New" panose="02070309020205020404" pitchFamily="49" charset="0"/>
-            </a:endParaRPr>
-          </a:p>
-        </p:txBody>
-      </p:sp>
-    </p:spTree>
-    <p:extLst>
-      <p:ext uri="{BB962C8B-B14F-4D97-AF65-F5344CB8AC3E}">
-        <p14:creationId xmlns:p14="http://schemas.microsoft.com/office/powerpoint/2010/main" val="921741580"/>
-      </p:ext>
-    </p:extLst>
-  </p:cSld>
-  <p:clrMapOvr>
-    <a:masterClrMapping/>
-  </p:clrMapOvr>
-  <p:timing>
-    <p:tnLst>
-      <p:par>
-        <p:cTn id="1" dur="indefinite" restart="never" nodeType="tmRoot">
-          <p:childTnLst>
-            <p:seq concurrent="1" nextAc="seek">
-              <p:cTn id="2" dur="indefinite" nodeType="mainSeq">
-                <p:childTnLst>
-                  <p:par>
-                    <p:cTn id="3" fill="hold">
-                      <p:stCondLst>
-                        <p:cond delay="indefinite"/>
-                      </p:stCondLst>
-                      <p:childTnLst>
-                        <p:par>
-                          <p:cTn id="4" fill="hold">
-                            <p:stCondLst>
-                              <p:cond delay="0"/>
-                            </p:stCondLst>
-                            <p:childTnLst>
-                              <p:par>
-                                <p:cTn id="5" presetID="10" presetClass="entr" presetSubtype="0" fill="hold" nodeType="clickEffect">
-                                  <p:stCondLst>
-                                    <p:cond delay="0"/>
-                                  </p:stCondLst>
-                                  <p:childTnLst>
-                                    <p:set>
-                                      <p:cBhvr>
-                                        <p:cTn id="6" dur="1" fill="hold">
-                                          <p:stCondLst>
-                                            <p:cond delay="0"/>
-                                          </p:stCondLst>
-                                        </p:cTn>
-                                        <p:tgtEl>
-                                          <p:spTgt spid="5">
-                                            <p:txEl>
-                                              <p:pRg st="2" end="2"/>
-                                            </p:txEl>
-                                          </p:spTgt>
-                                        </p:tgtEl>
-                                        <p:attrNameLst>
-                                          <p:attrName>style.visibility</p:attrName>
-                                        </p:attrNameLst>
-                                      </p:cBhvr>
-                                      <p:to>
-                                        <p:strVal val="visible"/>
-                                      </p:to>
-                                    </p:set>
-                                    <p:animEffect transition="in" filter="fade">
-                                      <p:cBhvr>
-                                        <p:cTn id="7" dur="500"/>
-                                        <p:tgtEl>
-                                          <p:spTgt spid="5">
                                             <p:txEl>
                                               <p:pRg st="2" end="2"/>
                                             </p:txEl>

</xml_diff>